<commit_message>
Deploy website Tue Oct 11 12:57:28 PDT 2022
</commit_message>
<xml_diff>
--- a/assets/slides/fa22/14-OOP_II.pptx
+++ b/assets/slides/fa22/14-OOP_II.pptx
@@ -5,27 +5,30 @@
     <p:sldMasterId id="2147484001" r:id="rId1"/>
   </p:sldMasterIdLst>
   <p:notesMasterIdLst>
-    <p:notesMasterId r:id="rId17"/>
+    <p:notesMasterId r:id="rId20"/>
   </p:notesMasterIdLst>
   <p:handoutMasterIdLst>
-    <p:handoutMasterId r:id="rId18"/>
+    <p:handoutMasterId r:id="rId21"/>
   </p:handoutMasterIdLst>
   <p:sldIdLst>
     <p:sldId id="360" r:id="rId2"/>
     <p:sldId id="371" r:id="rId3"/>
-    <p:sldId id="364" r:id="rId4"/>
-    <p:sldId id="363" r:id="rId5"/>
-    <p:sldId id="342" r:id="rId6"/>
-    <p:sldId id="350" r:id="rId7"/>
-    <p:sldId id="368" r:id="rId8"/>
-    <p:sldId id="369" r:id="rId9"/>
-    <p:sldId id="365" r:id="rId10"/>
-    <p:sldId id="366" r:id="rId11"/>
-    <p:sldId id="359" r:id="rId12"/>
-    <p:sldId id="358" r:id="rId13"/>
-    <p:sldId id="337" r:id="rId14"/>
-    <p:sldId id="349" r:id="rId15"/>
-    <p:sldId id="370" r:id="rId16"/>
+    <p:sldId id="372" r:id="rId4"/>
+    <p:sldId id="347" r:id="rId5"/>
+    <p:sldId id="351" r:id="rId6"/>
+    <p:sldId id="364" r:id="rId7"/>
+    <p:sldId id="363" r:id="rId8"/>
+    <p:sldId id="342" r:id="rId9"/>
+    <p:sldId id="350" r:id="rId10"/>
+    <p:sldId id="368" r:id="rId11"/>
+    <p:sldId id="369" r:id="rId12"/>
+    <p:sldId id="365" r:id="rId13"/>
+    <p:sldId id="366" r:id="rId14"/>
+    <p:sldId id="359" r:id="rId15"/>
+    <p:sldId id="358" r:id="rId16"/>
+    <p:sldId id="337" r:id="rId17"/>
+    <p:sldId id="349" r:id="rId18"/>
+    <p:sldId id="370" r:id="rId19"/>
   </p:sldIdLst>
   <p:sldSz cx="12192000" cy="6858000"/>
   <p:notesSz cx="6997700" cy="9194800"/>
@@ -671,14 +674,14 @@
           </a:ln>
           <a:extLst>
             <a:ext uri="{909E8E84-426E-40dd-AFC4-6F175D3DCCD1}">
-              <a14:hiddenFill xmlns="" xmlns:a14="http://schemas.microsoft.com/office/drawing/2010/main">
+              <a14:hiddenFill xmlns:a14="http://schemas.microsoft.com/office/drawing/2010/main" xmlns="">
                 <a:solidFill>
                   <a:srgbClr val="FFFFFF"/>
                 </a:solidFill>
               </a14:hiddenFill>
             </a:ext>
             <a:ext uri="{91240B29-F687-4f45-9708-019B960494DF}">
-              <a14:hiddenLine xmlns="" xmlns:a14="http://schemas.microsoft.com/office/drawing/2010/main" w="9525">
+              <a14:hiddenLine xmlns:a14="http://schemas.microsoft.com/office/drawing/2010/main" xmlns="" w="9525">
                 <a:solidFill>
                   <a:srgbClr val="000000"/>
                 </a:solidFill>
@@ -752,14 +755,14 @@
           </a:ln>
           <a:extLst>
             <a:ext uri="{909E8E84-426E-40dd-AFC4-6F175D3DCCD1}">
-              <a14:hiddenFill xmlns="" xmlns:a14="http://schemas.microsoft.com/office/drawing/2010/main">
+              <a14:hiddenFill xmlns:a14="http://schemas.microsoft.com/office/drawing/2010/main" xmlns="">
                 <a:solidFill>
                   <a:srgbClr val="FFFFFF"/>
                 </a:solidFill>
               </a14:hiddenFill>
             </a:ext>
             <a:ext uri="{FAA26D3D-D897-4be2-8F04-BA451C77F1D7}">
-              <ma14:placeholderFlag xmlns="" xmlns:ma14="http://schemas.microsoft.com/office/mac/drawingml/2011/main" val="1"/>
+              <ma14:placeholderFlag xmlns:ma14="http://schemas.microsoft.com/office/mac/drawingml/2011/main" xmlns="" val="1"/>
             </a:ext>
           </a:extLst>
         </p:spPr>
@@ -900,14 +903,14 @@
           <a:ln/>
           <a:extLst>
             <a:ext uri="{909E8E84-426E-40dd-AFC4-6F175D3DCCD1}">
-              <a14:hiddenFill xmlns="" xmlns:a14="http://schemas.microsoft.com/office/drawing/2010/main">
+              <a14:hiddenFill xmlns:a14="http://schemas.microsoft.com/office/drawing/2010/main" xmlns="">
                 <a:solidFill>
                   <a:srgbClr val="FFFFFF"/>
                 </a:solidFill>
               </a14:hiddenFill>
             </a:ext>
             <a:ext uri="{91240B29-F687-4f45-9708-019B960494DF}">
-              <a14:hiddenLine xmlns="" xmlns:a14="http://schemas.microsoft.com/office/drawing/2010/main" w="9525">
+              <a14:hiddenLine xmlns:a14="http://schemas.microsoft.com/office/drawing/2010/main" xmlns="" w="9525">
                 <a:solidFill>
                   <a:srgbClr val="000000"/>
                 </a:solidFill>
@@ -1075,14 +1078,14 @@
           <a:ln/>
           <a:extLst>
             <a:ext uri="{909E8E84-426E-40dd-AFC4-6F175D3DCCD1}">
-              <a14:hiddenFill xmlns="" xmlns:a14="http://schemas.microsoft.com/office/drawing/2010/main">
+              <a14:hiddenFill xmlns:a14="http://schemas.microsoft.com/office/drawing/2010/main" xmlns="">
                 <a:solidFill>
                   <a:srgbClr val="FFFFFF"/>
                 </a:solidFill>
               </a14:hiddenFill>
             </a:ext>
             <a:ext uri="{91240B29-F687-4f45-9708-019B960494DF}">
-              <a14:hiddenLine xmlns="" xmlns:a14="http://schemas.microsoft.com/office/drawing/2010/main" w="9525">
+              <a14:hiddenLine xmlns:a14="http://schemas.microsoft.com/office/drawing/2010/main" xmlns="" w="9525">
                 <a:solidFill>
                   <a:srgbClr val="000000"/>
                 </a:solidFill>
@@ -1092,7 +1095,7 @@
               </a14:hiddenLine>
             </a:ext>
             <a:ext uri="{FAA26D3D-D897-4be2-8F04-BA451C77F1D7}">
-              <ma14:placeholderFlag xmlns="" xmlns:ma14="http://schemas.microsoft.com/office/mac/drawingml/2011/main" val="1"/>
+              <ma14:placeholderFlag xmlns:ma14="http://schemas.microsoft.com/office/mac/drawingml/2011/main" xmlns="" val="1"/>
             </a:ext>
           </a:extLst>
         </p:spPr>
@@ -1148,14 +1151,14 @@
           <a:ln/>
           <a:extLst>
             <a:ext uri="{909E8E84-426E-40dd-AFC4-6F175D3DCCD1}">
-              <a14:hiddenFill xmlns="" xmlns:a14="http://schemas.microsoft.com/office/drawing/2010/main">
+              <a14:hiddenFill xmlns:a14="http://schemas.microsoft.com/office/drawing/2010/main" xmlns="">
                 <a:solidFill>
                   <a:srgbClr val="FFFFFF"/>
                 </a:solidFill>
               </a14:hiddenFill>
             </a:ext>
             <a:ext uri="{91240B29-F687-4f45-9708-019B960494DF}">
-              <a14:hiddenLine xmlns="" xmlns:a14="http://schemas.microsoft.com/office/drawing/2010/main" w="9525">
+              <a14:hiddenLine xmlns:a14="http://schemas.microsoft.com/office/drawing/2010/main" xmlns="" w="9525">
                 <a:solidFill>
                   <a:srgbClr val="000000"/>
                 </a:solidFill>
@@ -1282,7 +1285,7 @@
                 <a:latin typeface="FreightSans Pro Book" panose="02000606030000020004" pitchFamily="2" charset="0"/>
               </a:rPr>
               <a:pPr/>
-              <a:t>3</a:t>
+              <a:t>6</a:t>
             </a:fld>
             <a:endParaRPr lang="en-US" sz="900" dirty="0">
               <a:latin typeface="FreightSans Pro Book" panose="02000606030000020004" pitchFamily="2" charset="0"/>
@@ -1323,14 +1326,14 @@
           <a:ln/>
           <a:extLst>
             <a:ext uri="{909E8E84-426E-40dd-AFC4-6F175D3DCCD1}">
-              <a14:hiddenFill xmlns="" xmlns:a14="http://schemas.microsoft.com/office/drawing/2010/main">
+              <a14:hiddenFill xmlns:a14="http://schemas.microsoft.com/office/drawing/2010/main" xmlns="">
                 <a:solidFill>
                   <a:srgbClr val="FFFFFF"/>
                 </a:solidFill>
               </a14:hiddenFill>
             </a:ext>
             <a:ext uri="{91240B29-F687-4f45-9708-019B960494DF}">
-              <a14:hiddenLine xmlns="" xmlns:a14="http://schemas.microsoft.com/office/drawing/2010/main" w="9525">
+              <a14:hiddenLine xmlns:a14="http://schemas.microsoft.com/office/drawing/2010/main" xmlns="" w="9525">
                 <a:solidFill>
                   <a:srgbClr val="000000"/>
                 </a:solidFill>
@@ -1340,7 +1343,7 @@
               </a14:hiddenLine>
             </a:ext>
             <a:ext uri="{FAA26D3D-D897-4be2-8F04-BA451C77F1D7}">
-              <ma14:placeholderFlag xmlns="" xmlns:ma14="http://schemas.microsoft.com/office/mac/drawingml/2011/main" val="1"/>
+              <ma14:placeholderFlag xmlns:ma14="http://schemas.microsoft.com/office/mac/drawingml/2011/main" xmlns="" val="1"/>
             </a:ext>
           </a:extLst>
         </p:spPr>
@@ -1401,14 +1404,14 @@
           <a:ln/>
           <a:extLst>
             <a:ext uri="{909E8E84-426E-40dd-AFC4-6F175D3DCCD1}">
-              <a14:hiddenFill xmlns="" xmlns:a14="http://schemas.microsoft.com/office/drawing/2010/main">
+              <a14:hiddenFill xmlns:a14="http://schemas.microsoft.com/office/drawing/2010/main" xmlns="">
                 <a:solidFill>
                   <a:srgbClr val="FFFFFF"/>
                 </a:solidFill>
               </a14:hiddenFill>
             </a:ext>
             <a:ext uri="{91240B29-F687-4f45-9708-019B960494DF}">
-              <a14:hiddenLine xmlns="" xmlns:a14="http://schemas.microsoft.com/office/drawing/2010/main" w="9525">
+              <a14:hiddenLine xmlns:a14="http://schemas.microsoft.com/office/drawing/2010/main" xmlns="" w="9525">
                 <a:solidFill>
                   <a:srgbClr val="000000"/>
                 </a:solidFill>
@@ -1535,7 +1538,7 @@
                 <a:latin typeface="FreightSans Pro Book" panose="02000606030000020004" pitchFamily="2" charset="0"/>
               </a:rPr>
               <a:pPr/>
-              <a:t>9</a:t>
+              <a:t>12</a:t>
             </a:fld>
             <a:endParaRPr lang="en-US" sz="900" dirty="0">
               <a:latin typeface="FreightSans Pro Book" panose="02000606030000020004" pitchFamily="2" charset="0"/>
@@ -1576,14 +1579,14 @@
           <a:ln/>
           <a:extLst>
             <a:ext uri="{909E8E84-426E-40dd-AFC4-6F175D3DCCD1}">
-              <a14:hiddenFill xmlns="" xmlns:a14="http://schemas.microsoft.com/office/drawing/2010/main">
+              <a14:hiddenFill xmlns:a14="http://schemas.microsoft.com/office/drawing/2010/main" xmlns="">
                 <a:solidFill>
                   <a:srgbClr val="FFFFFF"/>
                 </a:solidFill>
               </a14:hiddenFill>
             </a:ext>
             <a:ext uri="{91240B29-F687-4f45-9708-019B960494DF}">
-              <a14:hiddenLine xmlns="" xmlns:a14="http://schemas.microsoft.com/office/drawing/2010/main" w="9525">
+              <a14:hiddenLine xmlns:a14="http://schemas.microsoft.com/office/drawing/2010/main" xmlns="" w="9525">
                 <a:solidFill>
                   <a:srgbClr val="000000"/>
                 </a:solidFill>
@@ -1593,7 +1596,7 @@
               </a14:hiddenLine>
             </a:ext>
             <a:ext uri="{FAA26D3D-D897-4be2-8F04-BA451C77F1D7}">
-              <ma14:placeholderFlag xmlns="" xmlns:ma14="http://schemas.microsoft.com/office/mac/drawingml/2011/main" val="1"/>
+              <ma14:placeholderFlag xmlns:ma14="http://schemas.microsoft.com/office/mac/drawingml/2011/main" xmlns="" val="1"/>
             </a:ext>
           </a:extLst>
         </p:spPr>
@@ -1666,7 +1669,7 @@
           </a:ln>
           <a:extLst>
             <a:ext uri="{909E8E84-426E-40dd-AFC4-6F175D3DCCD1}">
-              <a14:hiddenFill xmlns="" xmlns:a14="http://schemas.microsoft.com/office/drawing/2010/main">
+              <a14:hiddenFill xmlns:a14="http://schemas.microsoft.com/office/drawing/2010/main" xmlns="">
                 <a:noFill/>
               </a14:hiddenFill>
             </a:ext>
@@ -1709,14 +1712,14 @@
           </a:ln>
           <a:extLst>
             <a:ext uri="{909E8E84-426E-40dd-AFC4-6F175D3DCCD1}">
-              <a14:hiddenFill xmlns="" xmlns:a14="http://schemas.microsoft.com/office/drawing/2010/main">
+              <a14:hiddenFill xmlns:a14="http://schemas.microsoft.com/office/drawing/2010/main" xmlns="">
                 <a:solidFill>
                   <a:srgbClr val="FFFFFF"/>
                 </a:solidFill>
               </a14:hiddenFill>
             </a:ext>
             <a:ext uri="{91240B29-F687-4f45-9708-019B960494DF}">
-              <a14:hiddenLine xmlns="" xmlns:a14="http://schemas.microsoft.com/office/drawing/2010/main" w="9525">
+              <a14:hiddenLine xmlns:a14="http://schemas.microsoft.com/office/drawing/2010/main" xmlns="" w="9525">
                 <a:solidFill>
                   <a:srgbClr val="000000"/>
                 </a:solidFill>
@@ -1822,14 +1825,14 @@
           </a:ln>
           <a:extLst>
             <a:ext uri="{909E8E84-426E-40dd-AFC4-6F175D3DCCD1}">
-              <a14:hiddenFill xmlns="" xmlns:a14="http://schemas.microsoft.com/office/drawing/2010/main">
+              <a14:hiddenFill xmlns:a14="http://schemas.microsoft.com/office/drawing/2010/main" xmlns="">
                 <a:solidFill>
                   <a:srgbClr val="FFFFFF"/>
                 </a:solidFill>
               </a14:hiddenFill>
             </a:ext>
             <a:ext uri="{91240B29-F687-4f45-9708-019B960494DF}">
-              <a14:hiddenLine xmlns="" xmlns:a14="http://schemas.microsoft.com/office/drawing/2010/main" w="9525">
+              <a14:hiddenLine xmlns:a14="http://schemas.microsoft.com/office/drawing/2010/main" xmlns="" w="9525">
                 <a:solidFill>
                   <a:srgbClr val="000000"/>
                 </a:solidFill>
@@ -1839,7 +1842,7 @@
               </a14:hiddenLine>
             </a:ext>
             <a:ext uri="{FAA26D3D-D897-4be2-8F04-BA451C77F1D7}">
-              <ma14:placeholderFlag xmlns="" xmlns:ma14="http://schemas.microsoft.com/office/mac/drawingml/2011/main" val="1"/>
+              <ma14:placeholderFlag xmlns:ma14="http://schemas.microsoft.com/office/mac/drawingml/2011/main" xmlns="" val="1"/>
             </a:ext>
           </a:extLst>
         </p:spPr>
@@ -2179,14 +2182,14 @@
           </a:ln>
           <a:extLst>
             <a:ext uri="{909E8E84-426E-40dd-AFC4-6F175D3DCCD1}">
-              <a14:hiddenFill xmlns="" xmlns:a14="http://schemas.microsoft.com/office/drawing/2010/main">
+              <a14:hiddenFill xmlns:a14="http://schemas.microsoft.com/office/drawing/2010/main" xmlns="">
                 <a:solidFill>
                   <a:srgbClr val="FFFFFF"/>
                 </a:solidFill>
               </a14:hiddenFill>
             </a:ext>
             <a:ext uri="{91240B29-F687-4f45-9708-019B960494DF}">
-              <a14:hiddenLine xmlns="" xmlns:a14="http://schemas.microsoft.com/office/drawing/2010/main" w="9525">
+              <a14:hiddenLine xmlns:a14="http://schemas.microsoft.com/office/drawing/2010/main" xmlns="" w="9525">
                 <a:solidFill>
                   <a:srgbClr val="000000"/>
                 </a:solidFill>
@@ -2196,7 +2199,7 @@
               </a14:hiddenLine>
             </a:ext>
             <a:ext uri="{FAA26D3D-D897-4be2-8F04-BA451C77F1D7}">
-              <ma14:placeholderFlag xmlns="" xmlns:ma14="http://schemas.microsoft.com/office/mac/drawingml/2011/main" val="1"/>
+              <ma14:placeholderFlag xmlns:ma14="http://schemas.microsoft.com/office/mac/drawingml/2011/main" xmlns="" val="1"/>
             </a:ext>
           </a:extLst>
         </p:spPr>
@@ -4411,14 +4414,14 @@
           </a:ln>
           <a:extLst>
             <a:ext uri="{909E8E84-426E-40dd-AFC4-6F175D3DCCD1}">
-              <a14:hiddenFill xmlns="" xmlns:a14="http://schemas.microsoft.com/office/drawing/2010/main">
+              <a14:hiddenFill xmlns:a14="http://schemas.microsoft.com/office/drawing/2010/main" xmlns="">
                 <a:solidFill>
                   <a:srgbClr val="FFFFFF"/>
                 </a:solidFill>
               </a14:hiddenFill>
             </a:ext>
             <a:ext uri="{91240B29-F687-4f45-9708-019B960494DF}">
-              <a14:hiddenLine xmlns="" xmlns:a14="http://schemas.microsoft.com/office/drawing/2010/main" w="9525">
+              <a14:hiddenLine xmlns:a14="http://schemas.microsoft.com/office/drawing/2010/main" xmlns="" w="9525">
                 <a:solidFill>
                   <a:srgbClr val="000000"/>
                 </a:solidFill>
@@ -4428,7 +4431,7 @@
               </a14:hiddenLine>
             </a:ext>
             <a:ext uri="{FAA26D3D-D897-4be2-8F04-BA451C77F1D7}">
-              <ma14:placeholderFlag xmlns="" xmlns:ma14="http://schemas.microsoft.com/office/mac/drawingml/2011/main" val="1"/>
+              <ma14:placeholderFlag xmlns:ma14="http://schemas.microsoft.com/office/mac/drawingml/2011/main" xmlns="" val="1"/>
             </a:ext>
           </a:extLst>
         </p:spPr>
@@ -4472,14 +4475,14 @@
           </a:ln>
           <a:extLst>
             <a:ext uri="{909E8E84-426E-40dd-AFC4-6F175D3DCCD1}">
-              <a14:hiddenFill xmlns="" xmlns:a14="http://schemas.microsoft.com/office/drawing/2010/main">
+              <a14:hiddenFill xmlns:a14="http://schemas.microsoft.com/office/drawing/2010/main" xmlns="">
                 <a:solidFill>
                   <a:srgbClr val="FFFFFF"/>
                 </a:solidFill>
               </a14:hiddenFill>
             </a:ext>
             <a:ext uri="{91240B29-F687-4f45-9708-019B960494DF}">
-              <a14:hiddenLine xmlns="" xmlns:a14="http://schemas.microsoft.com/office/drawing/2010/main" w="9525">
+              <a14:hiddenLine xmlns:a14="http://schemas.microsoft.com/office/drawing/2010/main" xmlns="" w="9525">
                 <a:solidFill>
                   <a:srgbClr val="000000"/>
                 </a:solidFill>
@@ -4489,7 +4492,7 @@
               </a14:hiddenLine>
             </a:ext>
             <a:ext uri="{FAA26D3D-D897-4be2-8F04-BA451C77F1D7}">
-              <ma14:placeholderFlag xmlns="" xmlns:ma14="http://schemas.microsoft.com/office/mac/drawingml/2011/main" val="1"/>
+              <ma14:placeholderFlag xmlns:ma14="http://schemas.microsoft.com/office/mac/drawingml/2011/main" xmlns="" val="1"/>
             </a:ext>
           </a:extLst>
         </p:spPr>
@@ -4594,7 +4597,7 @@
           </a:ln>
           <a:extLst>
             <a:ext uri="{909E8E84-426E-40dd-AFC4-6F175D3DCCD1}">
-              <a14:hiddenFill xmlns="" xmlns:a14="http://schemas.microsoft.com/office/drawing/2010/main">
+              <a14:hiddenFill xmlns:a14="http://schemas.microsoft.com/office/drawing/2010/main" xmlns="">
                 <a:noFill/>
               </a14:hiddenFill>
             </a:ext>
@@ -4637,14 +4640,14 @@
           </a:ln>
           <a:extLst>
             <a:ext uri="{909E8E84-426E-40dd-AFC4-6F175D3DCCD1}">
-              <a14:hiddenFill xmlns="" xmlns:a14="http://schemas.microsoft.com/office/drawing/2010/main">
+              <a14:hiddenFill xmlns:a14="http://schemas.microsoft.com/office/drawing/2010/main" xmlns="">
                 <a:solidFill>
                   <a:srgbClr val="FFFFFF"/>
                 </a:solidFill>
               </a14:hiddenFill>
             </a:ext>
             <a:ext uri="{91240B29-F687-4f45-9708-019B960494DF}">
-              <a14:hiddenLine xmlns="" xmlns:a14="http://schemas.microsoft.com/office/drawing/2010/main" w="9525">
+              <a14:hiddenLine xmlns:a14="http://schemas.microsoft.com/office/drawing/2010/main" xmlns="" w="9525">
                 <a:solidFill>
                   <a:srgbClr val="000000"/>
                 </a:solidFill>
@@ -4684,14 +4687,14 @@
           </a:ln>
           <a:extLst>
             <a:ext uri="{909E8E84-426E-40dd-AFC4-6F175D3DCCD1}">
-              <a14:hiddenFill xmlns="" xmlns:a14="http://schemas.microsoft.com/office/drawing/2010/main">
+              <a14:hiddenFill xmlns:a14="http://schemas.microsoft.com/office/drawing/2010/main" xmlns="">
                 <a:solidFill>
                   <a:srgbClr val="FFFFFF"/>
                 </a:solidFill>
               </a14:hiddenFill>
             </a:ext>
             <a:ext uri="{91240B29-F687-4f45-9708-019B960494DF}">
-              <a14:hiddenLine xmlns="" xmlns:a14="http://schemas.microsoft.com/office/drawing/2010/main" w="9525">
+              <a14:hiddenLine xmlns:a14="http://schemas.microsoft.com/office/drawing/2010/main" xmlns="" w="9525">
                 <a:solidFill>
                   <a:srgbClr val="000000"/>
                 </a:solidFill>
@@ -4701,7 +4704,7 @@
               </a14:hiddenLine>
             </a:ext>
             <a:ext uri="{FAA26D3D-D897-4be2-8F04-BA451C77F1D7}">
-              <ma14:placeholderFlag xmlns="" xmlns:ma14="http://schemas.microsoft.com/office/mac/drawingml/2011/main" val="1"/>
+              <ma14:placeholderFlag xmlns:ma14="http://schemas.microsoft.com/office/mac/drawingml/2011/main" xmlns="" val="1"/>
             </a:ext>
           </a:extLst>
         </p:spPr>
@@ -5460,7 +5463,7 @@
           <p:cNvPr id="2" name="Title 1">
             <a:extLst>
               <a:ext uri="{FF2B5EF4-FFF2-40B4-BE49-F238E27FC236}">
-                <a16:creationId xmlns:a16="http://schemas.microsoft.com/office/drawing/2014/main" id="{EC42656B-C2CE-6541-B503-0DDD5B827655}"/>
+                <a16:creationId xmlns:a16="http://schemas.microsoft.com/office/drawing/2014/main" id="{5CC54221-AB87-1742-B0F3-04597FF2E297}"/>
               </a:ext>
             </a:extLst>
           </p:cNvPr>
@@ -5478,7 +5481,7 @@
           <a:p>
             <a:r>
               <a:rPr lang="en-US" dirty="0"/>
-              <a:t>Learning Objectives</a:t>
+              <a:t>More Magic Methods</a:t>
             </a:r>
           </a:p>
         </p:txBody>
@@ -5488,7 +5491,7 @@
           <p:cNvPr id="3" name="Content Placeholder 2">
             <a:extLst>
               <a:ext uri="{FF2B5EF4-FFF2-40B4-BE49-F238E27FC236}">
-                <a16:creationId xmlns:a16="http://schemas.microsoft.com/office/drawing/2014/main" id="{495FE291-2C1C-FF45-8F1A-ACF9950DCABA}"/>
+                <a16:creationId xmlns:a16="http://schemas.microsoft.com/office/drawing/2014/main" id="{4A768C81-1ED4-5C45-B2D8-D738DB1323E7}"/>
               </a:ext>
             </a:extLst>
           </p:cNvPr>
@@ -5505,20 +5508,159 @@
           <a:lstStyle/>
           <a:p>
             <a:r>
-              <a:rPr lang="en-US" sz="2400" dirty="0"/>
-              <a:t> Inheritance allows classes to reuse methods and attributes from a parent class.</a:t>
-            </a:r>
-          </a:p>
-          <a:p>
-            <a:r>
-              <a:rPr lang="en-US" sz="2400" dirty="0"/>
-              <a:t> super() is a new method in Python</a:t>
-            </a:r>
-          </a:p>
-          <a:p>
-            <a:r>
-              <a:rPr lang="en-US" sz="2400" dirty="0"/>
-              <a:t> Subclasses or child classes are distinct from on another, but share properties of the parent.</a:t>
+              <a:rPr lang="en-US" sz="2800" dirty="0"/>
+              <a:t>We will </a:t>
+            </a:r>
+            <a:r>
+              <a:rPr lang="en-US" sz="2800" b="1" dirty="0"/>
+              <a:t>not</a:t>
+            </a:r>
+            <a:r>
+              <a:rPr lang="en-US" sz="2800" dirty="0"/>
+              <a:t> go through an exhaustive list!</a:t>
+            </a:r>
+          </a:p>
+          <a:p>
+            <a:r>
+              <a:rPr lang="en-US" sz="2800" dirty="0"/>
+              <a:t> Magic Methods start and end with "double underscores" </a:t>
+            </a:r>
+            <a:r>
+              <a:rPr lang="en-US" sz="2800" dirty="0">
+                <a:latin typeface="Source Code Pro" panose="020B0509030403020204" pitchFamily="49" charset="0"/>
+                <a:ea typeface="Source Code Pro" panose="020B0509030403020204" pitchFamily="49" charset="0"/>
+              </a:rPr>
+              <a:t>__</a:t>
+            </a:r>
+          </a:p>
+          <a:p>
+            <a:r>
+              <a:rPr lang="en-US" sz="2800" dirty="0"/>
+              <a:t>They map to built-in functionality in Python. Many are logical names:</a:t>
+            </a:r>
+          </a:p>
+          <a:p>
+            <a:pPr lvl="1"/>
+            <a:r>
+              <a:rPr lang="en-US" sz="2800" dirty="0"/>
+              <a:t> </a:t>
+            </a:r>
+            <a:r>
+              <a:rPr lang="en-US" sz="2800" dirty="0">
+                <a:latin typeface="Source Code Pro" panose="020B0509030403020204" pitchFamily="49" charset="0"/>
+                <a:ea typeface="Source Code Pro" panose="020B0509030403020204" pitchFamily="49" charset="0"/>
+              </a:rPr>
+              <a:t>__add__</a:t>
+            </a:r>
+            <a:r>
+              <a:rPr lang="en-US" sz="2800" dirty="0"/>
+              <a:t> =&gt;  </a:t>
+            </a:r>
+            <a:r>
+              <a:rPr lang="en-US" sz="2800" dirty="0">
+                <a:latin typeface="Source Code Pro" panose="020B0509030403020204" pitchFamily="49" charset="0"/>
+                <a:ea typeface="Source Code Pro" panose="020B0509030403020204" pitchFamily="49" charset="0"/>
+              </a:rPr>
+              <a:t>+</a:t>
+            </a:r>
+            <a:r>
+              <a:rPr lang="en-US" sz="2800" dirty="0"/>
+              <a:t> operator</a:t>
+            </a:r>
+          </a:p>
+          <a:p>
+            <a:pPr lvl="1"/>
+            <a:r>
+              <a:rPr lang="en-US" sz="2800" dirty="0"/>
+              <a:t> </a:t>
+            </a:r>
+            <a:r>
+              <a:rPr lang="en-US" sz="2800" dirty="0">
+                <a:latin typeface="Source Code Pro" panose="020B0509030403020204" pitchFamily="49" charset="0"/>
+                <a:ea typeface="Source Code Pro" panose="020B0509030403020204" pitchFamily="49" charset="0"/>
+              </a:rPr>
+              <a:t>__sub__ </a:t>
+            </a:r>
+            <a:r>
+              <a:rPr lang="en-US" sz="2800" dirty="0"/>
+              <a:t>=&gt; </a:t>
+            </a:r>
+            <a:r>
+              <a:rPr lang="en-US" sz="2800" dirty="0">
+                <a:latin typeface="Source Code Pro" panose="020B0509030403020204" pitchFamily="49" charset="0"/>
+                <a:ea typeface="Source Code Pro" panose="020B0509030403020204" pitchFamily="49" charset="0"/>
+              </a:rPr>
+              <a:t>-</a:t>
+            </a:r>
+            <a:r>
+              <a:rPr lang="en-US" sz="2800" dirty="0"/>
+              <a:t> operator</a:t>
+            </a:r>
+          </a:p>
+          <a:p>
+            <a:pPr lvl="1"/>
+            <a:r>
+              <a:rPr lang="en-US" sz="2800" dirty="0"/>
+              <a:t> </a:t>
+            </a:r>
+            <a:r>
+              <a:rPr lang="en-US" sz="2800" dirty="0">
+                <a:latin typeface="Source Code Pro" panose="020B0509030403020204" pitchFamily="49" charset="0"/>
+                <a:ea typeface="Source Code Pro" panose="020B0509030403020204" pitchFamily="49" charset="0"/>
+              </a:rPr>
+              <a:t>__</a:t>
+            </a:r>
+            <a:r>
+              <a:rPr lang="en-US" sz="2800" dirty="0" err="1">
+                <a:latin typeface="Source Code Pro" panose="020B0509030403020204" pitchFamily="49" charset="0"/>
+                <a:ea typeface="Source Code Pro" panose="020B0509030403020204" pitchFamily="49" charset="0"/>
+              </a:rPr>
+              <a:t>getitem</a:t>
+            </a:r>
+            <a:r>
+              <a:rPr lang="en-US" sz="2800" dirty="0">
+                <a:latin typeface="Source Code Pro" panose="020B0509030403020204" pitchFamily="49" charset="0"/>
+                <a:ea typeface="Source Code Pro" panose="020B0509030403020204" pitchFamily="49" charset="0"/>
+              </a:rPr>
+              <a:t>__</a:t>
+            </a:r>
+            <a:r>
+              <a:rPr lang="en-US" sz="2800" dirty="0"/>
+              <a:t> =&gt; </a:t>
+            </a:r>
+            <a:r>
+              <a:rPr lang="en-US" sz="2800" dirty="0">
+                <a:latin typeface="Source Code Pro" panose="020B0509030403020204" pitchFamily="49" charset="0"/>
+                <a:ea typeface="Source Code Pro" panose="020B0509030403020204" pitchFamily="49" charset="0"/>
+              </a:rPr>
+              <a:t>[]</a:t>
+            </a:r>
+            <a:r>
+              <a:rPr lang="en-US" sz="2800" dirty="0"/>
+              <a:t> operator</a:t>
+            </a:r>
+          </a:p>
+          <a:p>
+            <a:r>
+              <a:rPr lang="en-US" sz="2800" dirty="0"/>
+              <a:t> A longer list for the curious:</a:t>
+            </a:r>
+          </a:p>
+          <a:p>
+            <a:pPr lvl="1"/>
+            <a:r>
+              <a:rPr lang="en-US" sz="2800" dirty="0"/>
+              <a:t> </a:t>
+            </a:r>
+            <a:r>
+              <a:rPr lang="en-US" sz="2800" dirty="0">
+                <a:hlinkClick r:id="rId2"/>
+              </a:rPr>
+              <a:t>https://docs.python.org/3/reference/datamodel.html</a:t>
+            </a:r>
+            <a:r>
+              <a:rPr lang="en-US" sz="2800" dirty="0"/>
+              <a:t> </a:t>
             </a:r>
           </a:p>
         </p:txBody>
@@ -5526,7 +5668,7 @@
     </p:spTree>
     <p:extLst>
       <p:ext uri="{BB962C8B-B14F-4D97-AF65-F5344CB8AC3E}">
-        <p14:creationId xmlns:p14="http://schemas.microsoft.com/office/powerpoint/2010/main" val="2058289803"/>
+        <p14:creationId xmlns:p14="http://schemas.microsoft.com/office/powerpoint/2010/main" val="288930881"/>
       </p:ext>
     </p:extLst>
   </p:cSld>
@@ -5555,7 +5697,13 @@
       </p:grpSpPr>
       <p:sp>
         <p:nvSpPr>
-          <p:cNvPr id="2" name="Title 1"/>
+          <p:cNvPr id="2" name="Title 1">
+            <a:extLst>
+              <a:ext uri="{FF2B5EF4-FFF2-40B4-BE49-F238E27FC236}">
+                <a16:creationId xmlns:a16="http://schemas.microsoft.com/office/drawing/2014/main" id="{4FA45057-AAA5-5A48-9B81-EB6F66132F39}"/>
+              </a:ext>
+            </a:extLst>
+          </p:cNvPr>
           <p:cNvSpPr>
             <a:spLocks noGrp="1"/>
           </p:cNvSpPr>
@@ -5570,14 +5718,20 @@
           <a:p>
             <a:r>
               <a:rPr lang="en-US" dirty="0"/>
-              <a:t>Inheritance</a:t>
+              <a:t>Live Demo</a:t>
             </a:r>
           </a:p>
         </p:txBody>
       </p:sp>
       <p:sp>
         <p:nvSpPr>
-          <p:cNvPr id="3" name="Content Placeholder 2"/>
+          <p:cNvPr id="3" name="Content Placeholder 2">
+            <a:extLst>
+              <a:ext uri="{FF2B5EF4-FFF2-40B4-BE49-F238E27FC236}">
+                <a16:creationId xmlns:a16="http://schemas.microsoft.com/office/drawing/2014/main" id="{7DDD5D33-F578-0540-94A6-AE539CC271DD}"/>
+              </a:ext>
+            </a:extLst>
+          </p:cNvPr>
           <p:cNvSpPr>
             <a:spLocks noGrp="1"/>
           </p:cNvSpPr>
@@ -5585,52 +5739,19 @@
             <p:ph idx="1"/>
           </p:nvPr>
         </p:nvSpPr>
-        <p:spPr>
-          <a:xfrm>
-            <a:off x="2209800" y="1295400"/>
-            <a:ext cx="7620000" cy="5029200"/>
-          </a:xfrm>
-        </p:spPr>
+        <p:spPr/>
         <p:txBody>
           <a:bodyPr/>
           <a:lstStyle/>
           <a:p>
-            <a:r>
-              <a:rPr lang="en-US" dirty="0"/>
-              <a:t>Define a class as a specialization of an existing class</a:t>
-            </a:r>
-          </a:p>
-          <a:p>
-            <a:r>
-              <a:rPr lang="en-US" dirty="0"/>
-              <a:t>Inherent its attributes, methods (behaviors)</a:t>
-            </a:r>
-          </a:p>
-          <a:p>
-            <a:r>
-              <a:rPr lang="en-US" dirty="0"/>
-              <a:t>Add additional ones</a:t>
-            </a:r>
-          </a:p>
-          <a:p>
-            <a:r>
-              <a:rPr lang="en-US" dirty="0"/>
-              <a:t>Redefine (specialize) existing ones</a:t>
-            </a:r>
-          </a:p>
-          <a:p>
-            <a:pPr lvl="1"/>
-            <a:r>
-              <a:rPr lang="en-US" dirty="0"/>
-              <a:t>Ones in superclass still accessible in its namespace</a:t>
-            </a:r>
+            <a:endParaRPr lang="en-US"/>
           </a:p>
         </p:txBody>
       </p:sp>
     </p:spTree>
     <p:extLst>
       <p:ext uri="{BB962C8B-B14F-4D97-AF65-F5344CB8AC3E}">
-        <p14:creationId xmlns:p14="http://schemas.microsoft.com/office/powerpoint/2010/main" val="1518462020"/>
+        <p14:creationId xmlns:p14="http://schemas.microsoft.com/office/powerpoint/2010/main" val="3124443451"/>
       </p:ext>
     </p:extLst>
   </p:cSld>
@@ -5659,40 +5780,18 @@
       </p:grpSpPr>
       <p:sp>
         <p:nvSpPr>
-          <p:cNvPr id="8" name="Title 7"/>
+          <p:cNvPr id="17411" name="Rectangle 2"/>
           <p:cNvSpPr>
-            <a:spLocks noGrp="1"/>
+            <a:spLocks noGrp="1" noChangeArrowheads="1"/>
           </p:cNvSpPr>
           <p:nvPr>
-            <p:ph type="title"/>
-          </p:nvPr>
-        </p:nvSpPr>
-        <p:spPr/>
-        <p:txBody>
-          <a:bodyPr/>
-          <a:lstStyle/>
-          <a:p>
-            <a:r>
-              <a:rPr lang="en-US" dirty="0"/>
-              <a:t>Class Inheritance</a:t>
-            </a:r>
-          </a:p>
-        </p:txBody>
-      </p:sp>
-      <p:sp>
-        <p:nvSpPr>
-          <p:cNvPr id="9" name="Content Placeholder 8"/>
-          <p:cNvSpPr>
-            <a:spLocks noGrp="1"/>
-          </p:cNvSpPr>
-          <p:nvPr>
-            <p:ph idx="1"/>
+            <p:ph type="ctrTitle"/>
           </p:nvPr>
         </p:nvSpPr>
         <p:spPr>
           <a:xfrm>
-            <a:off x="2209800" y="1066800"/>
-            <a:ext cx="8229600" cy="5257800"/>
+            <a:off x="2819400" y="2130432"/>
+            <a:ext cx="8458200" cy="1470025"/>
           </a:xfrm>
         </p:spPr>
         <p:txBody>
@@ -5701,48 +5800,36 @@
           <a:p>
             <a:r>
               <a:rPr lang="en-US" dirty="0"/>
-              <a:t>Classes can inherit methods and attributes from parent classes but extend into their own class.</a:t>
-            </a:r>
-          </a:p>
-          <a:p>
-            <a:endParaRPr lang="en-US" dirty="0"/>
+              <a:t>Object-Oriented Programming:</a:t>
+            </a:r>
+            <a:br>
+              <a:rPr lang="en-US" dirty="0"/>
+            </a:br>
+            <a:r>
+              <a:rPr lang="en-US" dirty="0"/>
+              <a:t>Inheritance</a:t>
+            </a:r>
           </a:p>
         </p:txBody>
       </p:sp>
-      <p:pic>
-        <p:nvPicPr>
-          <p:cNvPr id="2" name="Picture 1"/>
-          <p:cNvPicPr>
-            <a:picLocks noChangeAspect="1"/>
-          </p:cNvPicPr>
-          <p:nvPr/>
-        </p:nvPicPr>
-        <p:blipFill>
-          <a:blip r:embed="rId2"/>
-          <a:stretch>
-            <a:fillRect/>
-          </a:stretch>
-        </p:blipFill>
-        <p:spPr>
-          <a:xfrm>
-            <a:off x="2743200" y="2209800"/>
-            <a:ext cx="7010400" cy="3785616"/>
-          </a:xfrm>
-          <a:prstGeom prst="rect">
-            <a:avLst/>
-          </a:prstGeom>
-        </p:spPr>
-      </p:pic>
     </p:spTree>
     <p:extLst>
       <p:ext uri="{BB962C8B-B14F-4D97-AF65-F5344CB8AC3E}">
-        <p14:creationId xmlns:p14="http://schemas.microsoft.com/office/powerpoint/2010/main" val="1638929222"/>
+        <p14:creationId xmlns:p14="http://schemas.microsoft.com/office/powerpoint/2010/main" val="2854198525"/>
       </p:ext>
     </p:extLst>
   </p:cSld>
   <p:clrMapOvr>
     <a:masterClrMapping/>
   </p:clrMapOvr>
+  <mc:AlternateContent xmlns:mc="http://schemas.openxmlformats.org/markup-compatibility/2006" xmlns:p14="http://schemas.microsoft.com/office/powerpoint/2010/main">
+    <mc:Choice Requires="p14">
+      <p:transition spd="slow" p14:dur="2000" advTm="109658"/>
+    </mc:Choice>
+    <mc:Fallback xmlns="">
+      <p:transition xmlns:p14="http://schemas.microsoft.com/office/powerpoint/2010/main" spd="slow" advTm="109658"/>
+    </mc:Fallback>
+  </mc:AlternateContent>
 </p:sld>
 </file>
 
@@ -5765,7 +5852,13 @@
       </p:grpSpPr>
       <p:sp>
         <p:nvSpPr>
-          <p:cNvPr id="2" name="Title 1"/>
+          <p:cNvPr id="2" name="Title 1">
+            <a:extLst>
+              <a:ext uri="{FF2B5EF4-FFF2-40B4-BE49-F238E27FC236}">
+                <a16:creationId xmlns:a16="http://schemas.microsoft.com/office/drawing/2014/main" id="{EC42656B-C2CE-6541-B503-0DDD5B827655}"/>
+              </a:ext>
+            </a:extLst>
+          </p:cNvPr>
           <p:cNvSpPr>
             <a:spLocks noGrp="1"/>
           </p:cNvSpPr>
@@ -5780,273 +5873,55 @@
           <a:p>
             <a:r>
               <a:rPr lang="en-US" dirty="0"/>
-              <a:t>Python class statement</a:t>
+              <a:t>Learning Objectives</a:t>
             </a:r>
           </a:p>
         </p:txBody>
       </p:sp>
       <p:sp>
         <p:nvSpPr>
-          <p:cNvPr id="7" name="Rectangle 6"/>
-          <p:cNvSpPr/>
-          <p:nvPr/>
+          <p:cNvPr id="3" name="Content Placeholder 2">
+            <a:extLst>
+              <a:ext uri="{FF2B5EF4-FFF2-40B4-BE49-F238E27FC236}">
+                <a16:creationId xmlns:a16="http://schemas.microsoft.com/office/drawing/2014/main" id="{495FE291-2C1C-FF45-8F1A-ACF9950DCABA}"/>
+              </a:ext>
+            </a:extLst>
+          </p:cNvPr>
+          <p:cNvSpPr>
+            <a:spLocks noGrp="1"/>
+          </p:cNvSpPr>
+          <p:nvPr>
+            <p:ph idx="1"/>
+          </p:nvPr>
         </p:nvSpPr>
-        <p:spPr>
-          <a:xfrm>
-            <a:off x="2286000" y="1219200"/>
-            <a:ext cx="4572000" cy="1938992"/>
-          </a:xfrm>
-          <a:prstGeom prst="rect">
-            <a:avLst/>
-          </a:prstGeom>
-        </p:spPr>
+        <p:spPr/>
         <p:txBody>
-          <a:bodyPr>
-            <a:spAutoFit/>
-          </a:bodyPr>
+          <a:bodyPr/>
           <a:lstStyle/>
           <a:p>
             <a:r>
-              <a:rPr lang="de-DE" sz="2000" dirty="0" err="1">
-                <a:latin typeface="Source Code Pro" panose="020B0509030403020204" pitchFamily="49" charset="0"/>
-                <a:cs typeface="Courier New"/>
-              </a:rPr>
-              <a:t>class</a:t>
-            </a:r>
-            <a:r>
-              <a:rPr lang="de-DE" sz="2000" dirty="0">
-                <a:latin typeface="Source Code Pro" panose="020B0509030403020204" pitchFamily="49" charset="0"/>
-                <a:cs typeface="Courier New"/>
-              </a:rPr>
-              <a:t> </a:t>
-            </a:r>
-            <a:r>
-              <a:rPr lang="de-DE" sz="2000" dirty="0" err="1">
-                <a:latin typeface="Source Code Pro" panose="020B0509030403020204" pitchFamily="49" charset="0"/>
-                <a:cs typeface="Courier New"/>
-              </a:rPr>
-              <a:t>ClassName</a:t>
-            </a:r>
-            <a:r>
-              <a:rPr lang="de-DE" sz="2000" dirty="0">
-                <a:latin typeface="Source Code Pro" panose="020B0509030403020204" pitchFamily="49" charset="0"/>
-                <a:cs typeface="Courier New"/>
-              </a:rPr>
-              <a:t>:</a:t>
-            </a:r>
-          </a:p>
-          <a:p>
-            <a:r>
-              <a:rPr lang="de-DE" sz="2000" dirty="0">
-                <a:latin typeface="Source Code Pro" panose="020B0509030403020204" pitchFamily="49" charset="0"/>
-                <a:cs typeface="Courier New"/>
-              </a:rPr>
-              <a:t>    &lt;statement-1&gt;</a:t>
-            </a:r>
-          </a:p>
-          <a:p>
-            <a:r>
-              <a:rPr lang="de-DE" sz="2000" dirty="0">
-                <a:latin typeface="Source Code Pro" panose="020B0509030403020204" pitchFamily="49" charset="0"/>
-                <a:cs typeface="Courier New"/>
-              </a:rPr>
-              <a:t>    .</a:t>
-            </a:r>
-          </a:p>
-          <a:p>
-            <a:r>
-              <a:rPr lang="de-DE" sz="2000" dirty="0">
-                <a:latin typeface="Source Code Pro" panose="020B0509030403020204" pitchFamily="49" charset="0"/>
-                <a:cs typeface="Courier New"/>
-              </a:rPr>
-              <a:t>    .</a:t>
-            </a:r>
-          </a:p>
-          <a:p>
-            <a:r>
-              <a:rPr lang="de-DE" sz="2000" dirty="0">
-                <a:latin typeface="Source Code Pro" panose="020B0509030403020204" pitchFamily="49" charset="0"/>
-                <a:cs typeface="Courier New"/>
-              </a:rPr>
-              <a:t>    .</a:t>
-            </a:r>
-          </a:p>
-          <a:p>
-            <a:r>
-              <a:rPr lang="de-DE" sz="2000" dirty="0">
-                <a:latin typeface="Source Code Pro" panose="020B0509030403020204" pitchFamily="49" charset="0"/>
-                <a:cs typeface="Courier New"/>
-              </a:rPr>
-              <a:t>    &lt;</a:t>
-            </a:r>
-            <a:r>
-              <a:rPr lang="de-DE" sz="2000" dirty="0" err="1">
-                <a:latin typeface="Source Code Pro" panose="020B0509030403020204" pitchFamily="49" charset="0"/>
-                <a:cs typeface="Courier New"/>
-              </a:rPr>
-              <a:t>statement</a:t>
-            </a:r>
-            <a:r>
-              <a:rPr lang="de-DE" sz="2000" dirty="0">
-                <a:latin typeface="Source Code Pro" panose="020B0509030403020204" pitchFamily="49" charset="0"/>
-                <a:cs typeface="Courier New"/>
-              </a:rPr>
-              <a:t>-N&gt;</a:t>
-            </a:r>
-            <a:endParaRPr lang="en-US" sz="2000" dirty="0">
-              <a:latin typeface="Source Code Pro" panose="020B0509030403020204" pitchFamily="49" charset="0"/>
-              <a:cs typeface="Courier New"/>
-            </a:endParaRPr>
-          </a:p>
-        </p:txBody>
-      </p:sp>
-      <p:sp>
-        <p:nvSpPr>
-          <p:cNvPr id="8" name="Rectangle 7"/>
-          <p:cNvSpPr/>
-          <p:nvPr/>
-        </p:nvSpPr>
-        <p:spPr>
-          <a:xfrm>
-            <a:off x="2286000" y="3886200"/>
-            <a:ext cx="6934200" cy="1938992"/>
-          </a:xfrm>
-          <a:prstGeom prst="rect">
-            <a:avLst/>
-          </a:prstGeom>
-        </p:spPr>
-        <p:txBody>
-          <a:bodyPr wrap="square">
-            <a:spAutoFit/>
-          </a:bodyPr>
-          <a:lstStyle/>
-          <a:p>
-            <a:r>
-              <a:rPr lang="de-DE" sz="2000" b="1" dirty="0" err="1">
-                <a:latin typeface="Source Code Pro" panose="020B0509030403020204" pitchFamily="49" charset="0"/>
-                <a:cs typeface="Courier New"/>
-              </a:rPr>
-              <a:t>class</a:t>
-            </a:r>
-            <a:r>
-              <a:rPr lang="de-DE" sz="2000" b="1" dirty="0">
-                <a:latin typeface="Source Code Pro" panose="020B0509030403020204" pitchFamily="49" charset="0"/>
-                <a:cs typeface="Courier New"/>
-              </a:rPr>
-              <a:t> </a:t>
-            </a:r>
-            <a:r>
-              <a:rPr lang="de-DE" sz="2000" b="1" dirty="0" err="1">
-                <a:latin typeface="Source Code Pro" panose="020B0509030403020204" pitchFamily="49" charset="0"/>
-                <a:cs typeface="Courier New"/>
-              </a:rPr>
-              <a:t>ClassName</a:t>
-            </a:r>
-            <a:r>
-              <a:rPr lang="de-DE" sz="2000" b="1" dirty="0">
-                <a:latin typeface="Source Code Pro" panose="020B0509030403020204" pitchFamily="49" charset="0"/>
-                <a:cs typeface="Courier New"/>
-              </a:rPr>
-              <a:t> ( </a:t>
-            </a:r>
-            <a:r>
-              <a:rPr lang="de-DE" sz="2000" b="1" dirty="0" err="1">
-                <a:latin typeface="Source Code Pro" panose="020B0509030403020204" pitchFamily="49" charset="0"/>
-                <a:cs typeface="Courier New"/>
-              </a:rPr>
-              <a:t>inherits</a:t>
-            </a:r>
-            <a:r>
-              <a:rPr lang="de-DE" sz="2000" b="1" dirty="0">
-                <a:latin typeface="Source Code Pro" panose="020B0509030403020204" pitchFamily="49" charset="0"/>
-                <a:cs typeface="Courier New"/>
-              </a:rPr>
-              <a:t> / </a:t>
-            </a:r>
-            <a:r>
-              <a:rPr lang="de-DE" sz="2000" b="1" dirty="0" err="1">
-                <a:latin typeface="Source Code Pro" panose="020B0509030403020204" pitchFamily="49" charset="0"/>
-                <a:cs typeface="Courier New"/>
-              </a:rPr>
-              <a:t>parent-class</a:t>
-            </a:r>
-            <a:r>
-              <a:rPr lang="de-DE" sz="2000" b="1" dirty="0">
-                <a:latin typeface="Source Code Pro" panose="020B0509030403020204" pitchFamily="49" charset="0"/>
-                <a:cs typeface="Courier New"/>
-              </a:rPr>
-              <a:t> ):</a:t>
-            </a:r>
-          </a:p>
-          <a:p>
-            <a:r>
-              <a:rPr lang="de-DE" sz="2000" dirty="0">
-                <a:latin typeface="Source Code Pro" panose="020B0509030403020204" pitchFamily="49" charset="0"/>
-                <a:cs typeface="Courier New"/>
-              </a:rPr>
-              <a:t>    &lt;statement-1&gt;</a:t>
-            </a:r>
-          </a:p>
-          <a:p>
-            <a:r>
-              <a:rPr lang="de-DE" sz="2000" dirty="0">
-                <a:latin typeface="Source Code Pro" panose="020B0509030403020204" pitchFamily="49" charset="0"/>
-                <a:cs typeface="Courier New"/>
-              </a:rPr>
-              <a:t>    .</a:t>
-            </a:r>
-          </a:p>
-          <a:p>
-            <a:r>
-              <a:rPr lang="de-DE" sz="2000" dirty="0">
-                <a:latin typeface="Source Code Pro" panose="020B0509030403020204" pitchFamily="49" charset="0"/>
-                <a:cs typeface="Courier New"/>
-              </a:rPr>
-              <a:t>    .</a:t>
-            </a:r>
-          </a:p>
-          <a:p>
-            <a:r>
-              <a:rPr lang="de-DE" sz="2000" dirty="0">
-                <a:latin typeface="Source Code Pro" panose="020B0509030403020204" pitchFamily="49" charset="0"/>
-                <a:cs typeface="Courier New"/>
-              </a:rPr>
-              <a:t>    .</a:t>
-            </a:r>
-          </a:p>
-          <a:p>
-            <a:r>
-              <a:rPr lang="de-DE" sz="2000" dirty="0">
-                <a:latin typeface="Source Code Pro" panose="020B0509030403020204" pitchFamily="49" charset="0"/>
-                <a:cs typeface="Courier New"/>
-              </a:rPr>
-              <a:t>    &lt;</a:t>
-            </a:r>
-            <a:r>
-              <a:rPr lang="de-DE" sz="2000" dirty="0" err="1">
-                <a:latin typeface="Source Code Pro" panose="020B0509030403020204" pitchFamily="49" charset="0"/>
-                <a:cs typeface="Courier New"/>
-              </a:rPr>
-              <a:t>statement</a:t>
-            </a:r>
-            <a:r>
-              <a:rPr lang="de-DE" sz="2000" dirty="0">
-                <a:latin typeface="Source Code Pro" panose="020B0509030403020204" pitchFamily="49" charset="0"/>
-                <a:cs typeface="Courier New"/>
-              </a:rPr>
-              <a:t>-N&gt;</a:t>
-            </a:r>
-            <a:endParaRPr lang="en-US" sz="2000" dirty="0">
-              <a:latin typeface="Source Code Pro" panose="020B0509030403020204" pitchFamily="49" charset="0"/>
-              <a:cs typeface="Courier New"/>
-            </a:endParaRPr>
+              <a:rPr lang="en-US" sz="2400" dirty="0"/>
+              <a:t> Inheritance allows classes to reuse methods and attributes from a parent class.</a:t>
+            </a:r>
+          </a:p>
+          <a:p>
+            <a:r>
+              <a:rPr lang="en-US" sz="2400" dirty="0"/>
+              <a:t> super() is a new method in Python</a:t>
+            </a:r>
+          </a:p>
+          <a:p>
+            <a:r>
+              <a:rPr lang="en-US" sz="2400" dirty="0"/>
+              <a:t> Subclasses or child classes are distinct from on another, but share properties of the parent.</a:t>
+            </a:r>
           </a:p>
         </p:txBody>
       </p:sp>
     </p:spTree>
     <p:extLst>
       <p:ext uri="{BB962C8B-B14F-4D97-AF65-F5344CB8AC3E}">
-        <p14:creationId xmlns:p14="http://schemas.microsoft.com/office/powerpoint/2010/main" val="3999492501"/>
+        <p14:creationId xmlns:p14="http://schemas.microsoft.com/office/powerpoint/2010/main" val="2058289803"/>
       </p:ext>
     </p:extLst>
   </p:cSld>
@@ -6090,6 +5965,526 @@
           <a:p>
             <a:r>
               <a:rPr lang="en-US" dirty="0"/>
+              <a:t>Inheritance</a:t>
+            </a:r>
+          </a:p>
+        </p:txBody>
+      </p:sp>
+      <p:sp>
+        <p:nvSpPr>
+          <p:cNvPr id="3" name="Content Placeholder 2"/>
+          <p:cNvSpPr>
+            <a:spLocks noGrp="1"/>
+          </p:cNvSpPr>
+          <p:nvPr>
+            <p:ph idx="1"/>
+          </p:nvPr>
+        </p:nvSpPr>
+        <p:spPr>
+          <a:xfrm>
+            <a:off x="2209800" y="1295400"/>
+            <a:ext cx="7620000" cy="5029200"/>
+          </a:xfrm>
+        </p:spPr>
+        <p:txBody>
+          <a:bodyPr/>
+          <a:lstStyle/>
+          <a:p>
+            <a:r>
+              <a:rPr lang="en-US" dirty="0"/>
+              <a:t>Define a class as a specialization of an existing class</a:t>
+            </a:r>
+          </a:p>
+          <a:p>
+            <a:r>
+              <a:rPr lang="en-US" dirty="0"/>
+              <a:t>Inherent its attributes, methods (behaviors)</a:t>
+            </a:r>
+          </a:p>
+          <a:p>
+            <a:r>
+              <a:rPr lang="en-US" dirty="0"/>
+              <a:t>Add additional ones</a:t>
+            </a:r>
+          </a:p>
+          <a:p>
+            <a:r>
+              <a:rPr lang="en-US" dirty="0"/>
+              <a:t>Redefine (specialize) existing ones</a:t>
+            </a:r>
+          </a:p>
+          <a:p>
+            <a:pPr lvl="1"/>
+            <a:r>
+              <a:rPr lang="en-US" dirty="0"/>
+              <a:t>Ones in superclass still accessible in its namespace</a:t>
+            </a:r>
+          </a:p>
+        </p:txBody>
+      </p:sp>
+    </p:spTree>
+    <p:extLst>
+      <p:ext uri="{BB962C8B-B14F-4D97-AF65-F5344CB8AC3E}">
+        <p14:creationId xmlns:p14="http://schemas.microsoft.com/office/powerpoint/2010/main" val="1518462020"/>
+      </p:ext>
+    </p:extLst>
+  </p:cSld>
+  <p:clrMapOvr>
+    <a:masterClrMapping/>
+  </p:clrMapOvr>
+</p:sld>
+</file>
+
+<file path=ppt/slides/slide15.xml><?xml version="1.0" encoding="utf-8"?>
+<p:sld xmlns:a="http://schemas.openxmlformats.org/drawingml/2006/main" xmlns:r="http://schemas.openxmlformats.org/officeDocument/2006/relationships" xmlns:p="http://schemas.openxmlformats.org/presentationml/2006/main">
+  <p:cSld>
+    <p:spTree>
+      <p:nvGrpSpPr>
+        <p:cNvPr id="1" name=""/>
+        <p:cNvGrpSpPr/>
+        <p:nvPr/>
+      </p:nvGrpSpPr>
+      <p:grpSpPr>
+        <a:xfrm>
+          <a:off x="0" y="0"/>
+          <a:ext cx="0" cy="0"/>
+          <a:chOff x="0" y="0"/>
+          <a:chExt cx="0" cy="0"/>
+        </a:xfrm>
+      </p:grpSpPr>
+      <p:sp>
+        <p:nvSpPr>
+          <p:cNvPr id="8" name="Title 7"/>
+          <p:cNvSpPr>
+            <a:spLocks noGrp="1"/>
+          </p:cNvSpPr>
+          <p:nvPr>
+            <p:ph type="title"/>
+          </p:nvPr>
+        </p:nvSpPr>
+        <p:spPr/>
+        <p:txBody>
+          <a:bodyPr/>
+          <a:lstStyle/>
+          <a:p>
+            <a:r>
+              <a:rPr lang="en-US" dirty="0"/>
+              <a:t>Class Inheritance</a:t>
+            </a:r>
+          </a:p>
+        </p:txBody>
+      </p:sp>
+      <p:sp>
+        <p:nvSpPr>
+          <p:cNvPr id="9" name="Content Placeholder 8"/>
+          <p:cNvSpPr>
+            <a:spLocks noGrp="1"/>
+          </p:cNvSpPr>
+          <p:nvPr>
+            <p:ph idx="1"/>
+          </p:nvPr>
+        </p:nvSpPr>
+        <p:spPr>
+          <a:xfrm>
+            <a:off x="2209800" y="1066800"/>
+            <a:ext cx="8229600" cy="5257800"/>
+          </a:xfrm>
+        </p:spPr>
+        <p:txBody>
+          <a:bodyPr/>
+          <a:lstStyle/>
+          <a:p>
+            <a:r>
+              <a:rPr lang="en-US" dirty="0"/>
+              <a:t>Classes can inherit methods and attributes from parent classes but extend into their own class.</a:t>
+            </a:r>
+          </a:p>
+          <a:p>
+            <a:endParaRPr lang="en-US" dirty="0"/>
+          </a:p>
+        </p:txBody>
+      </p:sp>
+      <p:pic>
+        <p:nvPicPr>
+          <p:cNvPr id="2" name="Picture 1"/>
+          <p:cNvPicPr>
+            <a:picLocks noChangeAspect="1"/>
+          </p:cNvPicPr>
+          <p:nvPr/>
+        </p:nvPicPr>
+        <p:blipFill>
+          <a:blip r:embed="rId2"/>
+          <a:stretch>
+            <a:fillRect/>
+          </a:stretch>
+        </p:blipFill>
+        <p:spPr>
+          <a:xfrm>
+            <a:off x="2743200" y="2209800"/>
+            <a:ext cx="7010400" cy="3785616"/>
+          </a:xfrm>
+          <a:prstGeom prst="rect">
+            <a:avLst/>
+          </a:prstGeom>
+        </p:spPr>
+      </p:pic>
+    </p:spTree>
+    <p:extLst>
+      <p:ext uri="{BB962C8B-B14F-4D97-AF65-F5344CB8AC3E}">
+        <p14:creationId xmlns:p14="http://schemas.microsoft.com/office/powerpoint/2010/main" val="1638929222"/>
+      </p:ext>
+    </p:extLst>
+  </p:cSld>
+  <p:clrMapOvr>
+    <a:masterClrMapping/>
+  </p:clrMapOvr>
+</p:sld>
+</file>
+
+<file path=ppt/slides/slide16.xml><?xml version="1.0" encoding="utf-8"?>
+<p:sld xmlns:a="http://schemas.openxmlformats.org/drawingml/2006/main" xmlns:r="http://schemas.openxmlformats.org/officeDocument/2006/relationships" xmlns:p="http://schemas.openxmlformats.org/presentationml/2006/main">
+  <p:cSld>
+    <p:spTree>
+      <p:nvGrpSpPr>
+        <p:cNvPr id="1" name=""/>
+        <p:cNvGrpSpPr/>
+        <p:nvPr/>
+      </p:nvGrpSpPr>
+      <p:grpSpPr>
+        <a:xfrm>
+          <a:off x="0" y="0"/>
+          <a:ext cx="0" cy="0"/>
+          <a:chOff x="0" y="0"/>
+          <a:chExt cx="0" cy="0"/>
+        </a:xfrm>
+      </p:grpSpPr>
+      <p:sp>
+        <p:nvSpPr>
+          <p:cNvPr id="2" name="Title 1"/>
+          <p:cNvSpPr>
+            <a:spLocks noGrp="1"/>
+          </p:cNvSpPr>
+          <p:nvPr>
+            <p:ph type="title"/>
+          </p:nvPr>
+        </p:nvSpPr>
+        <p:spPr/>
+        <p:txBody>
+          <a:bodyPr/>
+          <a:lstStyle/>
+          <a:p>
+            <a:r>
+              <a:rPr lang="en-US" dirty="0"/>
+              <a:t>Python class statement</a:t>
+            </a:r>
+          </a:p>
+        </p:txBody>
+      </p:sp>
+      <p:sp>
+        <p:nvSpPr>
+          <p:cNvPr id="7" name="Rectangle 6"/>
+          <p:cNvSpPr/>
+          <p:nvPr/>
+        </p:nvSpPr>
+        <p:spPr>
+          <a:xfrm>
+            <a:off x="2286000" y="1219200"/>
+            <a:ext cx="4572000" cy="1938992"/>
+          </a:xfrm>
+          <a:prstGeom prst="rect">
+            <a:avLst/>
+          </a:prstGeom>
+        </p:spPr>
+        <p:txBody>
+          <a:bodyPr>
+            <a:spAutoFit/>
+          </a:bodyPr>
+          <a:lstStyle/>
+          <a:p>
+            <a:r>
+              <a:rPr lang="de-DE" sz="2000" dirty="0" err="1">
+                <a:latin typeface="Source Code Pro" panose="020B0509030403020204" pitchFamily="49" charset="0"/>
+                <a:cs typeface="Courier New"/>
+              </a:rPr>
+              <a:t>class</a:t>
+            </a:r>
+            <a:r>
+              <a:rPr lang="de-DE" sz="2000" dirty="0">
+                <a:latin typeface="Source Code Pro" panose="020B0509030403020204" pitchFamily="49" charset="0"/>
+                <a:cs typeface="Courier New"/>
+              </a:rPr>
+              <a:t> </a:t>
+            </a:r>
+            <a:r>
+              <a:rPr lang="de-DE" sz="2000" dirty="0" err="1">
+                <a:latin typeface="Source Code Pro" panose="020B0509030403020204" pitchFamily="49" charset="0"/>
+                <a:cs typeface="Courier New"/>
+              </a:rPr>
+              <a:t>ClassName</a:t>
+            </a:r>
+            <a:r>
+              <a:rPr lang="de-DE" sz="2000" dirty="0">
+                <a:latin typeface="Source Code Pro" panose="020B0509030403020204" pitchFamily="49" charset="0"/>
+                <a:cs typeface="Courier New"/>
+              </a:rPr>
+              <a:t>:</a:t>
+            </a:r>
+          </a:p>
+          <a:p>
+            <a:r>
+              <a:rPr lang="de-DE" sz="2000" dirty="0">
+                <a:latin typeface="Source Code Pro" panose="020B0509030403020204" pitchFamily="49" charset="0"/>
+                <a:cs typeface="Courier New"/>
+              </a:rPr>
+              <a:t>    &lt;statement-1&gt;</a:t>
+            </a:r>
+          </a:p>
+          <a:p>
+            <a:r>
+              <a:rPr lang="de-DE" sz="2000" dirty="0">
+                <a:latin typeface="Source Code Pro" panose="020B0509030403020204" pitchFamily="49" charset="0"/>
+                <a:cs typeface="Courier New"/>
+              </a:rPr>
+              <a:t>    .</a:t>
+            </a:r>
+          </a:p>
+          <a:p>
+            <a:r>
+              <a:rPr lang="de-DE" sz="2000" dirty="0">
+                <a:latin typeface="Source Code Pro" panose="020B0509030403020204" pitchFamily="49" charset="0"/>
+                <a:cs typeface="Courier New"/>
+              </a:rPr>
+              <a:t>    .</a:t>
+            </a:r>
+          </a:p>
+          <a:p>
+            <a:r>
+              <a:rPr lang="de-DE" sz="2000" dirty="0">
+                <a:latin typeface="Source Code Pro" panose="020B0509030403020204" pitchFamily="49" charset="0"/>
+                <a:cs typeface="Courier New"/>
+              </a:rPr>
+              <a:t>    .</a:t>
+            </a:r>
+          </a:p>
+          <a:p>
+            <a:r>
+              <a:rPr lang="de-DE" sz="2000" dirty="0">
+                <a:latin typeface="Source Code Pro" panose="020B0509030403020204" pitchFamily="49" charset="0"/>
+                <a:cs typeface="Courier New"/>
+              </a:rPr>
+              <a:t>    &lt;</a:t>
+            </a:r>
+            <a:r>
+              <a:rPr lang="de-DE" sz="2000" dirty="0" err="1">
+                <a:latin typeface="Source Code Pro" panose="020B0509030403020204" pitchFamily="49" charset="0"/>
+                <a:cs typeface="Courier New"/>
+              </a:rPr>
+              <a:t>statement</a:t>
+            </a:r>
+            <a:r>
+              <a:rPr lang="de-DE" sz="2000" dirty="0">
+                <a:latin typeface="Source Code Pro" panose="020B0509030403020204" pitchFamily="49" charset="0"/>
+                <a:cs typeface="Courier New"/>
+              </a:rPr>
+              <a:t>-N&gt;</a:t>
+            </a:r>
+            <a:endParaRPr lang="en-US" sz="2000" dirty="0">
+              <a:latin typeface="Source Code Pro" panose="020B0509030403020204" pitchFamily="49" charset="0"/>
+              <a:cs typeface="Courier New"/>
+            </a:endParaRPr>
+          </a:p>
+        </p:txBody>
+      </p:sp>
+      <p:sp>
+        <p:nvSpPr>
+          <p:cNvPr id="8" name="Rectangle 7"/>
+          <p:cNvSpPr/>
+          <p:nvPr/>
+        </p:nvSpPr>
+        <p:spPr>
+          <a:xfrm>
+            <a:off x="2286000" y="3886200"/>
+            <a:ext cx="6934200" cy="1938992"/>
+          </a:xfrm>
+          <a:prstGeom prst="rect">
+            <a:avLst/>
+          </a:prstGeom>
+        </p:spPr>
+        <p:txBody>
+          <a:bodyPr wrap="square">
+            <a:spAutoFit/>
+          </a:bodyPr>
+          <a:lstStyle/>
+          <a:p>
+            <a:r>
+              <a:rPr lang="de-DE" sz="2000" b="1" dirty="0" err="1">
+                <a:latin typeface="Source Code Pro" panose="020B0509030403020204" pitchFamily="49" charset="0"/>
+                <a:cs typeface="Courier New"/>
+              </a:rPr>
+              <a:t>class</a:t>
+            </a:r>
+            <a:r>
+              <a:rPr lang="de-DE" sz="2000" b="1" dirty="0">
+                <a:latin typeface="Source Code Pro" panose="020B0509030403020204" pitchFamily="49" charset="0"/>
+                <a:cs typeface="Courier New"/>
+              </a:rPr>
+              <a:t> </a:t>
+            </a:r>
+            <a:r>
+              <a:rPr lang="de-DE" sz="2000" b="1" dirty="0" err="1">
+                <a:latin typeface="Source Code Pro" panose="020B0509030403020204" pitchFamily="49" charset="0"/>
+                <a:cs typeface="Courier New"/>
+              </a:rPr>
+              <a:t>ClassName</a:t>
+            </a:r>
+            <a:r>
+              <a:rPr lang="de-DE" sz="2000" b="1" dirty="0">
+                <a:latin typeface="Source Code Pro" panose="020B0509030403020204" pitchFamily="49" charset="0"/>
+                <a:cs typeface="Courier New"/>
+              </a:rPr>
+              <a:t> ( </a:t>
+            </a:r>
+            <a:r>
+              <a:rPr lang="de-DE" sz="2000" b="1" dirty="0" err="1">
+                <a:latin typeface="Source Code Pro" panose="020B0509030403020204" pitchFamily="49" charset="0"/>
+                <a:cs typeface="Courier New"/>
+              </a:rPr>
+              <a:t>inherits</a:t>
+            </a:r>
+            <a:r>
+              <a:rPr lang="de-DE" sz="2000" b="1" dirty="0">
+                <a:latin typeface="Source Code Pro" panose="020B0509030403020204" pitchFamily="49" charset="0"/>
+                <a:cs typeface="Courier New"/>
+              </a:rPr>
+              <a:t> / </a:t>
+            </a:r>
+            <a:r>
+              <a:rPr lang="de-DE" sz="2000" b="1" dirty="0" err="1">
+                <a:latin typeface="Source Code Pro" panose="020B0509030403020204" pitchFamily="49" charset="0"/>
+                <a:cs typeface="Courier New"/>
+              </a:rPr>
+              <a:t>parent-class</a:t>
+            </a:r>
+            <a:r>
+              <a:rPr lang="de-DE" sz="2000" b="1" dirty="0">
+                <a:latin typeface="Source Code Pro" panose="020B0509030403020204" pitchFamily="49" charset="0"/>
+                <a:cs typeface="Courier New"/>
+              </a:rPr>
+              <a:t> ):</a:t>
+            </a:r>
+          </a:p>
+          <a:p>
+            <a:r>
+              <a:rPr lang="de-DE" sz="2000" dirty="0">
+                <a:latin typeface="Source Code Pro" panose="020B0509030403020204" pitchFamily="49" charset="0"/>
+                <a:cs typeface="Courier New"/>
+              </a:rPr>
+              <a:t>    &lt;statement-1&gt;</a:t>
+            </a:r>
+          </a:p>
+          <a:p>
+            <a:r>
+              <a:rPr lang="de-DE" sz="2000" dirty="0">
+                <a:latin typeface="Source Code Pro" panose="020B0509030403020204" pitchFamily="49" charset="0"/>
+                <a:cs typeface="Courier New"/>
+              </a:rPr>
+              <a:t>    .</a:t>
+            </a:r>
+          </a:p>
+          <a:p>
+            <a:r>
+              <a:rPr lang="de-DE" sz="2000" dirty="0">
+                <a:latin typeface="Source Code Pro" panose="020B0509030403020204" pitchFamily="49" charset="0"/>
+                <a:cs typeface="Courier New"/>
+              </a:rPr>
+              <a:t>    .</a:t>
+            </a:r>
+          </a:p>
+          <a:p>
+            <a:r>
+              <a:rPr lang="de-DE" sz="2000" dirty="0">
+                <a:latin typeface="Source Code Pro" panose="020B0509030403020204" pitchFamily="49" charset="0"/>
+                <a:cs typeface="Courier New"/>
+              </a:rPr>
+              <a:t>    .</a:t>
+            </a:r>
+          </a:p>
+          <a:p>
+            <a:r>
+              <a:rPr lang="de-DE" sz="2000" dirty="0">
+                <a:latin typeface="Source Code Pro" panose="020B0509030403020204" pitchFamily="49" charset="0"/>
+                <a:cs typeface="Courier New"/>
+              </a:rPr>
+              <a:t>    &lt;</a:t>
+            </a:r>
+            <a:r>
+              <a:rPr lang="de-DE" sz="2000" dirty="0" err="1">
+                <a:latin typeface="Source Code Pro" panose="020B0509030403020204" pitchFamily="49" charset="0"/>
+                <a:cs typeface="Courier New"/>
+              </a:rPr>
+              <a:t>statement</a:t>
+            </a:r>
+            <a:r>
+              <a:rPr lang="de-DE" sz="2000" dirty="0">
+                <a:latin typeface="Source Code Pro" panose="020B0509030403020204" pitchFamily="49" charset="0"/>
+                <a:cs typeface="Courier New"/>
+              </a:rPr>
+              <a:t>-N&gt;</a:t>
+            </a:r>
+            <a:endParaRPr lang="en-US" sz="2000" dirty="0">
+              <a:latin typeface="Source Code Pro" panose="020B0509030403020204" pitchFamily="49" charset="0"/>
+              <a:cs typeface="Courier New"/>
+            </a:endParaRPr>
+          </a:p>
+        </p:txBody>
+      </p:sp>
+    </p:spTree>
+    <p:extLst>
+      <p:ext uri="{BB962C8B-B14F-4D97-AF65-F5344CB8AC3E}">
+        <p14:creationId xmlns:p14="http://schemas.microsoft.com/office/powerpoint/2010/main" val="3999492501"/>
+      </p:ext>
+    </p:extLst>
+  </p:cSld>
+  <p:clrMapOvr>
+    <a:masterClrMapping/>
+  </p:clrMapOvr>
+</p:sld>
+</file>
+
+<file path=ppt/slides/slide17.xml><?xml version="1.0" encoding="utf-8"?>
+<p:sld xmlns:a="http://schemas.openxmlformats.org/drawingml/2006/main" xmlns:r="http://schemas.openxmlformats.org/officeDocument/2006/relationships" xmlns:p="http://schemas.openxmlformats.org/presentationml/2006/main">
+  <p:cSld>
+    <p:spTree>
+      <p:nvGrpSpPr>
+        <p:cNvPr id="1" name=""/>
+        <p:cNvGrpSpPr/>
+        <p:nvPr/>
+      </p:nvGrpSpPr>
+      <p:grpSpPr>
+        <a:xfrm>
+          <a:off x="0" y="0"/>
+          <a:ext cx="0" cy="0"/>
+          <a:chOff x="0" y="0"/>
+          <a:chExt cx="0" cy="0"/>
+        </a:xfrm>
+      </p:grpSpPr>
+      <p:sp>
+        <p:nvSpPr>
+          <p:cNvPr id="2" name="Title 1"/>
+          <p:cNvSpPr>
+            <a:spLocks noGrp="1"/>
+          </p:cNvSpPr>
+          <p:nvPr>
+            <p:ph type="title"/>
+          </p:nvPr>
+        </p:nvSpPr>
+        <p:spPr/>
+        <p:txBody>
+          <a:bodyPr/>
+          <a:lstStyle/>
+          <a:p>
+            <a:r>
+              <a:rPr lang="en-US" dirty="0"/>
               <a:t>Example</a:t>
             </a:r>
           </a:p>
@@ -6535,7 +6930,7 @@
 </p:sld>
 </file>
 
-<file path=ppt/slides/slide15.xml><?xml version="1.0" encoding="utf-8"?>
+<file path=ppt/slides/slide18.xml><?xml version="1.0" encoding="utf-8"?>
 <p:sld xmlns:a="http://schemas.openxmlformats.org/drawingml/2006/main" xmlns:r="http://schemas.openxmlformats.org/officeDocument/2006/relationships" xmlns:p="http://schemas.openxmlformats.org/presentationml/2006/main">
   <p:cSld>
     <p:spTree>
@@ -6763,50 +7158,78 @@
           <a:p>
             <a:r>
               <a:rPr lang="en-US" dirty="0"/>
-              <a:t> Midterm 3/16 7-9pm</a:t>
+              <a:t> Midterm 10/ 7-9pm</a:t>
             </a:r>
           </a:p>
           <a:p>
             <a:pPr lvl="1"/>
             <a:r>
               <a:rPr lang="en-US" dirty="0"/>
-              <a:t> Remote option available</a:t>
+              <a:t> Locations and assignments will be sent early next week</a:t>
             </a:r>
           </a:p>
           <a:p>
             <a:pPr lvl="1"/>
             <a:r>
               <a:rPr lang="en-US" dirty="0"/>
-              <a:t> Please wear masks in the exam room</a:t>
+              <a:t> Unli19mited Handwritten Sheets – but try to use no more than 3-4!</a:t>
+            </a:r>
+          </a:p>
+          <a:p>
+            <a:r>
+              <a:rPr lang="en-US" dirty="0"/>
+              <a:t> Lecture: Thurs 10/14 – More OOP Practice</a:t>
+            </a:r>
+          </a:p>
+          <a:p>
+            <a:r>
+              <a:rPr lang="en-US" dirty="0"/>
+              <a:t> Lecture: Tues 10/18 – Exam Review / Q&amp;A</a:t>
+            </a:r>
+          </a:p>
+          <a:p>
+            <a:r>
+              <a:rPr lang="en-US" dirty="0"/>
+              <a:t>Check the Calendar!</a:t>
             </a:r>
           </a:p>
           <a:p>
             <a:pPr lvl="1"/>
             <a:r>
               <a:rPr lang="en-US" dirty="0"/>
-              <a:t> Unlimited Handwritten Sheets – but try to use no more than 3-4!</a:t>
-            </a:r>
-          </a:p>
-          <a:p>
-            <a:r>
-              <a:rPr lang="en-US" dirty="0"/>
-              <a:t> Lecture: Monday 3/14 – Review/Q&amp;A</a:t>
-            </a:r>
-          </a:p>
-          <a:p>
-            <a:r>
-              <a:rPr lang="en-US" dirty="0"/>
-              <a:t> Lecture: Weds 3/16 – No Lecture, just study / relax. </a:t>
-            </a:r>
-          </a:p>
-          <a:p>
-            <a:r>
-              <a:rPr lang="en-US" dirty="0"/>
-              <a:t> then you've got </a:t>
-            </a:r>
-            <a:r>
-              <a:rPr lang="en-US"/>
-              <a:t>Spring break! </a:t>
+              <a:t> Exam Review Sessions led by Tutors Fri 3-5pm (Cory 277) (time moved!)</a:t>
+            </a:r>
+          </a:p>
+          <a:p>
+            <a:pPr lvl="1"/>
+            <a:r>
+              <a:rPr lang="en-US" dirty="0"/>
+              <a:t> New "topical" review sessions by TAs</a:t>
+            </a:r>
+          </a:p>
+          <a:p>
+            <a:pPr lvl="1"/>
+            <a:r>
+              <a:rPr lang="en-US" dirty="0"/>
+              <a:t> CSM review sessions too</a:t>
+            </a:r>
+          </a:p>
+          <a:p>
+            <a:r>
+              <a:rPr lang="en-US" dirty="0"/>
+              <a:t> No labs next week</a:t>
+            </a:r>
+          </a:p>
+          <a:p>
+            <a:r>
+              <a:rPr lang="en-US" dirty="0"/>
+              <a:t> TAKE A DEEP BREATH! Y'all can do this. </a:t>
+            </a:r>
+            <a:r>
+              <a:rPr lang="en-US" dirty="0">
+                <a:sym typeface="Wingdings" pitchFamily="2" charset="2"/>
+              </a:rPr>
+              <a:t> </a:t>
             </a:r>
             <a:endParaRPr lang="en-US" dirty="0"/>
           </a:p>
@@ -6826,6 +7249,1156 @@
 </file>
 
 <file path=ppt/slides/slide3.xml><?xml version="1.0" encoding="utf-8"?>
+<p:sld xmlns:a="http://schemas.openxmlformats.org/drawingml/2006/main" xmlns:r="http://schemas.openxmlformats.org/officeDocument/2006/relationships" xmlns:p="http://schemas.openxmlformats.org/presentationml/2006/main">
+  <p:cSld>
+    <p:spTree>
+      <p:nvGrpSpPr>
+        <p:cNvPr id="1" name=""/>
+        <p:cNvGrpSpPr/>
+        <p:nvPr/>
+      </p:nvGrpSpPr>
+      <p:grpSpPr>
+        <a:xfrm>
+          <a:off x="0" y="0"/>
+          <a:ext cx="0" cy="0"/>
+          <a:chOff x="0" y="0"/>
+          <a:chExt cx="0" cy="0"/>
+        </a:xfrm>
+      </p:grpSpPr>
+      <p:sp>
+        <p:nvSpPr>
+          <p:cNvPr id="2" name="Title 1">
+            <a:extLst>
+              <a:ext uri="{FF2B5EF4-FFF2-40B4-BE49-F238E27FC236}">
+                <a16:creationId xmlns:a16="http://schemas.microsoft.com/office/drawing/2014/main" id="{C062C829-EA96-51C8-72A3-6226C2B85228}"/>
+              </a:ext>
+            </a:extLst>
+          </p:cNvPr>
+          <p:cNvSpPr>
+            <a:spLocks noGrp="1"/>
+          </p:cNvSpPr>
+          <p:nvPr>
+            <p:ph type="title"/>
+          </p:nvPr>
+        </p:nvSpPr>
+        <p:spPr/>
+        <p:txBody>
+          <a:bodyPr/>
+          <a:lstStyle/>
+          <a:p>
+            <a:r>
+              <a:rPr lang="en-US" dirty="0"/>
+              <a:t>Classes Can Have Attributes Too!</a:t>
+            </a:r>
+          </a:p>
+        </p:txBody>
+      </p:sp>
+      <p:sp>
+        <p:nvSpPr>
+          <p:cNvPr id="3" name="Content Placeholder 2">
+            <a:extLst>
+              <a:ext uri="{FF2B5EF4-FFF2-40B4-BE49-F238E27FC236}">
+                <a16:creationId xmlns:a16="http://schemas.microsoft.com/office/drawing/2014/main" id="{8161A4D9-F3EA-1352-C7E7-4D6B6137851C}"/>
+              </a:ext>
+            </a:extLst>
+          </p:cNvPr>
+          <p:cNvSpPr>
+            <a:spLocks noGrp="1"/>
+          </p:cNvSpPr>
+          <p:nvPr>
+            <p:ph idx="1"/>
+          </p:nvPr>
+        </p:nvSpPr>
+        <p:spPr/>
+        <p:txBody>
+          <a:bodyPr/>
+          <a:lstStyle/>
+          <a:p>
+            <a:r>
+              <a:rPr lang="en-US" dirty="0"/>
+              <a:t> Class attributes (as opposed to </a:t>
+            </a:r>
+            <a:r>
+              <a:rPr lang="en-US" i="1" dirty="0"/>
+              <a:t>instance</a:t>
+            </a:r>
+            <a:r>
+              <a:rPr lang="en-US" dirty="0"/>
+              <a:t> attributes) belong to the class itself, instead of each object</a:t>
+            </a:r>
+          </a:p>
+          <a:p>
+            <a:pPr lvl="1"/>
+            <a:r>
+              <a:rPr lang="en-US" dirty="0"/>
+              <a:t> This means there is one value which is shared for all of the class's objects</a:t>
+            </a:r>
+          </a:p>
+          <a:p>
+            <a:r>
+              <a:rPr lang="en-US" dirty="0"/>
+              <a:t> Be Careful!</a:t>
+            </a:r>
+          </a:p>
+          <a:p>
+            <a:pPr lvl="1"/>
+            <a:r>
+              <a:rPr lang="en-US" dirty="0"/>
+              <a:t> It's easy to overdo class attributes</a:t>
+            </a:r>
+          </a:p>
+        </p:txBody>
+      </p:sp>
+    </p:spTree>
+    <p:extLst>
+      <p:ext uri="{BB962C8B-B14F-4D97-AF65-F5344CB8AC3E}">
+        <p14:creationId xmlns:p14="http://schemas.microsoft.com/office/powerpoint/2010/main" val="3161016049"/>
+      </p:ext>
+    </p:extLst>
+  </p:cSld>
+  <p:clrMapOvr>
+    <a:masterClrMapping/>
+  </p:clrMapOvr>
+</p:sld>
+</file>
+
+<file path=ppt/slides/slide4.xml><?xml version="1.0" encoding="utf-8"?>
+<p:sld xmlns:a="http://schemas.openxmlformats.org/drawingml/2006/main" xmlns:r="http://schemas.openxmlformats.org/officeDocument/2006/relationships" xmlns:p="http://schemas.openxmlformats.org/presentationml/2006/main">
+  <p:cSld>
+    <p:spTree>
+      <p:nvGrpSpPr>
+        <p:cNvPr id="1" name=""/>
+        <p:cNvGrpSpPr/>
+        <p:nvPr/>
+      </p:nvGrpSpPr>
+      <p:grpSpPr>
+        <a:xfrm>
+          <a:off x="0" y="0"/>
+          <a:ext cx="0" cy="0"/>
+          <a:chOff x="0" y="0"/>
+          <a:chExt cx="0" cy="0"/>
+        </a:xfrm>
+      </p:grpSpPr>
+      <p:sp>
+        <p:nvSpPr>
+          <p:cNvPr id="2" name="Title 1"/>
+          <p:cNvSpPr>
+            <a:spLocks noGrp="1"/>
+          </p:cNvSpPr>
+          <p:nvPr>
+            <p:ph type="title"/>
+          </p:nvPr>
+        </p:nvSpPr>
+        <p:spPr/>
+        <p:txBody>
+          <a:bodyPr/>
+          <a:lstStyle/>
+          <a:p>
+            <a:r>
+              <a:rPr lang="en-US" dirty="0"/>
+              <a:t>Example: class attribute</a:t>
+            </a:r>
+          </a:p>
+        </p:txBody>
+      </p:sp>
+      <p:sp>
+        <p:nvSpPr>
+          <p:cNvPr id="7" name="Rectangle 6"/>
+          <p:cNvSpPr/>
+          <p:nvPr/>
+        </p:nvSpPr>
+        <p:spPr>
+          <a:xfrm>
+            <a:off x="2133600" y="1295401"/>
+            <a:ext cx="8077200" cy="5109091"/>
+          </a:xfrm>
+          <a:prstGeom prst="rect">
+            <a:avLst/>
+          </a:prstGeom>
+        </p:spPr>
+        <p:txBody>
+          <a:bodyPr wrap="square">
+            <a:spAutoFit/>
+          </a:bodyPr>
+          <a:lstStyle/>
+          <a:p>
+            <a:r>
+              <a:rPr lang="en-US" dirty="0">
+                <a:latin typeface="Source Code Pro" panose="020B0509030403020204" pitchFamily="49" charset="0"/>
+                <a:cs typeface="Courier New"/>
+              </a:rPr>
+              <a:t>class </a:t>
+            </a:r>
+            <a:r>
+              <a:rPr lang="en-US" dirty="0" err="1">
+                <a:latin typeface="Source Code Pro" panose="020B0509030403020204" pitchFamily="49" charset="0"/>
+                <a:cs typeface="Courier New"/>
+              </a:rPr>
+              <a:t>BaseAccount</a:t>
+            </a:r>
+            <a:r>
+              <a:rPr lang="en-US" dirty="0">
+                <a:latin typeface="Source Code Pro" panose="020B0509030403020204" pitchFamily="49" charset="0"/>
+                <a:cs typeface="Courier New"/>
+              </a:rPr>
+              <a:t>:</a:t>
+            </a:r>
+          </a:p>
+          <a:p>
+            <a:r>
+              <a:rPr lang="en-US" dirty="0">
+                <a:latin typeface="Source Code Pro" panose="020B0509030403020204" pitchFamily="49" charset="0"/>
+                <a:cs typeface="Courier New"/>
+              </a:rPr>
+              <a:t>    </a:t>
+            </a:r>
+            <a:r>
+              <a:rPr lang="en-US" dirty="0" err="1">
+                <a:solidFill>
+                  <a:srgbClr val="0000FF"/>
+                </a:solidFill>
+                <a:latin typeface="Source Code Pro" panose="020B0509030403020204" pitchFamily="49" charset="0"/>
+                <a:cs typeface="Courier New"/>
+              </a:rPr>
+              <a:t>account_number_seed</a:t>
+            </a:r>
+            <a:r>
+              <a:rPr lang="en-US" dirty="0">
+                <a:solidFill>
+                  <a:srgbClr val="0000FF"/>
+                </a:solidFill>
+                <a:latin typeface="Source Code Pro" panose="020B0509030403020204" pitchFamily="49" charset="0"/>
+                <a:cs typeface="Courier New"/>
+              </a:rPr>
+              <a:t> = 1000</a:t>
+            </a:r>
+          </a:p>
+          <a:p>
+            <a:endParaRPr lang="en-US" dirty="0">
+              <a:latin typeface="Source Code Pro" panose="020B0509030403020204" pitchFamily="49" charset="0"/>
+              <a:cs typeface="Courier New"/>
+            </a:endParaRPr>
+          </a:p>
+          <a:p>
+            <a:r>
+              <a:rPr lang="en-US" dirty="0">
+                <a:latin typeface="Source Code Pro" panose="020B0509030403020204" pitchFamily="49" charset="0"/>
+                <a:cs typeface="Courier New"/>
+              </a:rPr>
+              <a:t>    </a:t>
+            </a:r>
+            <a:r>
+              <a:rPr lang="en-US" dirty="0" err="1">
+                <a:latin typeface="Source Code Pro" panose="020B0509030403020204" pitchFamily="49" charset="0"/>
+                <a:cs typeface="Courier New"/>
+              </a:rPr>
+              <a:t>def</a:t>
+            </a:r>
+            <a:r>
+              <a:rPr lang="en-US" dirty="0">
+                <a:latin typeface="Source Code Pro" panose="020B0509030403020204" pitchFamily="49" charset="0"/>
+                <a:cs typeface="Courier New"/>
+              </a:rPr>
+              <a:t> __</a:t>
+            </a:r>
+            <a:r>
+              <a:rPr lang="en-US" dirty="0" err="1">
+                <a:latin typeface="Source Code Pro" panose="020B0509030403020204" pitchFamily="49" charset="0"/>
+                <a:cs typeface="Courier New"/>
+              </a:rPr>
+              <a:t>init</a:t>
+            </a:r>
+            <a:r>
+              <a:rPr lang="en-US" dirty="0">
+                <a:latin typeface="Source Code Pro" panose="020B0509030403020204" pitchFamily="49" charset="0"/>
+                <a:cs typeface="Courier New"/>
+              </a:rPr>
+              <a:t>__(self, name, </a:t>
+            </a:r>
+            <a:r>
+              <a:rPr lang="en-US" dirty="0" err="1">
+                <a:latin typeface="Source Code Pro" panose="020B0509030403020204" pitchFamily="49" charset="0"/>
+                <a:cs typeface="Courier New"/>
+              </a:rPr>
+              <a:t>initial_deposit</a:t>
+            </a:r>
+            <a:r>
+              <a:rPr lang="en-US" dirty="0">
+                <a:latin typeface="Source Code Pro" panose="020B0509030403020204" pitchFamily="49" charset="0"/>
+                <a:cs typeface="Courier New"/>
+              </a:rPr>
+              <a:t>): </a:t>
+            </a:r>
+          </a:p>
+          <a:p>
+            <a:r>
+              <a:rPr lang="en-US" dirty="0">
+                <a:latin typeface="Source Code Pro" panose="020B0509030403020204" pitchFamily="49" charset="0"/>
+                <a:cs typeface="Courier New"/>
+              </a:rPr>
+              <a:t>        </a:t>
+            </a:r>
+            <a:r>
+              <a:rPr lang="en-US" dirty="0" err="1">
+                <a:latin typeface="Source Code Pro" panose="020B0509030403020204" pitchFamily="49" charset="0"/>
+                <a:cs typeface="Courier New"/>
+              </a:rPr>
+              <a:t>self._name</a:t>
+            </a:r>
+            <a:r>
+              <a:rPr lang="en-US" dirty="0">
+                <a:latin typeface="Source Code Pro" panose="020B0509030403020204" pitchFamily="49" charset="0"/>
+                <a:cs typeface="Courier New"/>
+              </a:rPr>
+              <a:t> = name </a:t>
+            </a:r>
+          </a:p>
+          <a:p>
+            <a:r>
+              <a:rPr lang="en-US" dirty="0">
+                <a:latin typeface="Source Code Pro" panose="020B0509030403020204" pitchFamily="49" charset="0"/>
+                <a:cs typeface="Courier New"/>
+              </a:rPr>
+              <a:t>        </a:t>
+            </a:r>
+            <a:r>
+              <a:rPr lang="en-US" dirty="0" err="1">
+                <a:latin typeface="Source Code Pro" panose="020B0509030403020204" pitchFamily="49" charset="0"/>
+                <a:cs typeface="Courier New"/>
+              </a:rPr>
+              <a:t>self._balance</a:t>
+            </a:r>
+            <a:r>
+              <a:rPr lang="en-US" dirty="0">
+                <a:latin typeface="Source Code Pro" panose="020B0509030403020204" pitchFamily="49" charset="0"/>
+                <a:cs typeface="Courier New"/>
+              </a:rPr>
+              <a:t> = </a:t>
+            </a:r>
+            <a:r>
+              <a:rPr lang="en-US" dirty="0" err="1">
+                <a:latin typeface="Source Code Pro" panose="020B0509030403020204" pitchFamily="49" charset="0"/>
+                <a:cs typeface="Courier New"/>
+              </a:rPr>
+              <a:t>initial_deposit</a:t>
+            </a:r>
+            <a:r>
+              <a:rPr lang="en-US" dirty="0">
+                <a:latin typeface="Source Code Pro" panose="020B0509030403020204" pitchFamily="49" charset="0"/>
+                <a:cs typeface="Courier New"/>
+              </a:rPr>
+              <a:t> </a:t>
+            </a:r>
+          </a:p>
+          <a:p>
+            <a:r>
+              <a:rPr lang="en-US" dirty="0">
+                <a:latin typeface="Source Code Pro" panose="020B0509030403020204" pitchFamily="49" charset="0"/>
+                <a:cs typeface="Courier New"/>
+              </a:rPr>
+              <a:t>        self._</a:t>
+            </a:r>
+            <a:r>
+              <a:rPr lang="en-US" dirty="0" err="1">
+                <a:latin typeface="Source Code Pro" panose="020B0509030403020204" pitchFamily="49" charset="0"/>
+                <a:cs typeface="Courier New"/>
+              </a:rPr>
+              <a:t>acct_no</a:t>
+            </a:r>
+            <a:r>
+              <a:rPr lang="en-US" dirty="0">
+                <a:latin typeface="Source Code Pro" panose="020B0509030403020204" pitchFamily="49" charset="0"/>
+                <a:cs typeface="Courier New"/>
+              </a:rPr>
+              <a:t> = </a:t>
+            </a:r>
+            <a:r>
+              <a:rPr lang="en-US" dirty="0" err="1">
+                <a:solidFill>
+                  <a:srgbClr val="0000FF"/>
+                </a:solidFill>
+                <a:latin typeface="Source Code Pro" panose="020B0509030403020204" pitchFamily="49" charset="0"/>
+                <a:cs typeface="Courier New"/>
+              </a:rPr>
+              <a:t>BaseAccount.account_number_seed</a:t>
+            </a:r>
+            <a:r>
+              <a:rPr lang="en-US" dirty="0">
+                <a:latin typeface="Source Code Pro" panose="020B0509030403020204" pitchFamily="49" charset="0"/>
+                <a:cs typeface="Courier New"/>
+              </a:rPr>
+              <a:t>     </a:t>
+            </a:r>
+          </a:p>
+          <a:p>
+            <a:r>
+              <a:rPr lang="en-US" dirty="0">
+                <a:latin typeface="Source Code Pro" panose="020B0509030403020204" pitchFamily="49" charset="0"/>
+                <a:cs typeface="Courier New"/>
+              </a:rPr>
+              <a:t>        </a:t>
+            </a:r>
+            <a:r>
+              <a:rPr lang="en-US" dirty="0" err="1">
+                <a:solidFill>
+                  <a:srgbClr val="0000FF"/>
+                </a:solidFill>
+                <a:latin typeface="Source Code Pro" panose="020B0509030403020204" pitchFamily="49" charset="0"/>
+                <a:cs typeface="Courier New"/>
+              </a:rPr>
+              <a:t>BaseAccount.</a:t>
+            </a:r>
+            <a:r>
+              <a:rPr lang="en-US" dirty="0" err="1">
+                <a:latin typeface="Source Code Pro" panose="020B0509030403020204" pitchFamily="49" charset="0"/>
+                <a:cs typeface="Courier New"/>
+              </a:rPr>
+              <a:t>account_number_seed</a:t>
+            </a:r>
+            <a:r>
+              <a:rPr lang="en-US" dirty="0">
+                <a:latin typeface="Source Code Pro" panose="020B0509030403020204" pitchFamily="49" charset="0"/>
+                <a:cs typeface="Courier New"/>
+              </a:rPr>
+              <a:t> += 1</a:t>
+            </a:r>
+          </a:p>
+          <a:p>
+            <a:r>
+              <a:rPr lang="en-US" dirty="0">
+                <a:latin typeface="Source Code Pro" panose="020B0509030403020204" pitchFamily="49" charset="0"/>
+                <a:cs typeface="Courier New"/>
+              </a:rPr>
+              <a:t>    </a:t>
+            </a:r>
+          </a:p>
+          <a:p>
+            <a:r>
+              <a:rPr lang="en-US" dirty="0">
+                <a:latin typeface="Source Code Pro" panose="020B0509030403020204" pitchFamily="49" charset="0"/>
+                <a:cs typeface="Courier New"/>
+              </a:rPr>
+              <a:t>    def name(self):</a:t>
+            </a:r>
+          </a:p>
+          <a:p>
+            <a:r>
+              <a:rPr lang="en-US" dirty="0">
+                <a:latin typeface="Source Code Pro" panose="020B0509030403020204" pitchFamily="49" charset="0"/>
+                <a:cs typeface="Courier New"/>
+              </a:rPr>
+              <a:t>        return </a:t>
+            </a:r>
+            <a:r>
+              <a:rPr lang="en-US" dirty="0" err="1">
+                <a:latin typeface="Source Code Pro" panose="020B0509030403020204" pitchFamily="49" charset="0"/>
+                <a:cs typeface="Courier New"/>
+              </a:rPr>
+              <a:t>self</a:t>
+            </a:r>
+            <a:r>
+              <a:rPr lang="en-US" sz="2000" dirty="0" err="1">
+                <a:solidFill>
+                  <a:srgbClr val="0000FF"/>
+                </a:solidFill>
+                <a:latin typeface="Source Code Pro" panose="020B0509030403020204" pitchFamily="49" charset="0"/>
+                <a:cs typeface="Courier New"/>
+              </a:rPr>
+              <a:t>._</a:t>
+            </a:r>
+            <a:r>
+              <a:rPr lang="en-US" dirty="0" err="1">
+                <a:latin typeface="Source Code Pro" panose="020B0509030403020204" pitchFamily="49" charset="0"/>
+                <a:cs typeface="Courier New"/>
+              </a:rPr>
+              <a:t>name</a:t>
+            </a:r>
+            <a:endParaRPr lang="en-US" dirty="0">
+              <a:latin typeface="Source Code Pro" panose="020B0509030403020204" pitchFamily="49" charset="0"/>
+              <a:cs typeface="Courier New"/>
+            </a:endParaRPr>
+          </a:p>
+          <a:p>
+            <a:endParaRPr lang="en-US" dirty="0">
+              <a:latin typeface="Source Code Pro" panose="020B0509030403020204" pitchFamily="49" charset="0"/>
+              <a:cs typeface="Courier New"/>
+            </a:endParaRPr>
+          </a:p>
+          <a:p>
+            <a:r>
+              <a:rPr lang="en-US" dirty="0">
+                <a:latin typeface="Source Code Pro" panose="020B0509030403020204" pitchFamily="49" charset="0"/>
+                <a:cs typeface="Courier New"/>
+              </a:rPr>
+              <a:t>    </a:t>
+            </a:r>
+            <a:r>
+              <a:rPr lang="en-US" dirty="0" err="1">
+                <a:latin typeface="Source Code Pro" panose="020B0509030403020204" pitchFamily="49" charset="0"/>
+                <a:cs typeface="Courier New"/>
+              </a:rPr>
+              <a:t>def</a:t>
+            </a:r>
+            <a:r>
+              <a:rPr lang="en-US" dirty="0">
+                <a:latin typeface="Source Code Pro" panose="020B0509030403020204" pitchFamily="49" charset="0"/>
+                <a:cs typeface="Courier New"/>
+              </a:rPr>
+              <a:t> balance(self):</a:t>
+            </a:r>
+          </a:p>
+          <a:p>
+            <a:r>
+              <a:rPr lang="en-US" dirty="0">
+                <a:latin typeface="Source Code Pro" panose="020B0509030403020204" pitchFamily="49" charset="0"/>
+                <a:cs typeface="Courier New"/>
+              </a:rPr>
+              <a:t>        return </a:t>
+            </a:r>
+            <a:r>
+              <a:rPr lang="en-US" dirty="0" err="1">
+                <a:latin typeface="Source Code Pro" panose="020B0509030403020204" pitchFamily="49" charset="0"/>
+                <a:cs typeface="Courier New"/>
+              </a:rPr>
+              <a:t>self._balance</a:t>
+            </a:r>
+            <a:endParaRPr lang="en-US" dirty="0">
+              <a:latin typeface="Source Code Pro" panose="020B0509030403020204" pitchFamily="49" charset="0"/>
+              <a:cs typeface="Courier New"/>
+            </a:endParaRPr>
+          </a:p>
+          <a:p>
+            <a:endParaRPr lang="en-US" dirty="0">
+              <a:latin typeface="Source Code Pro" panose="020B0509030403020204" pitchFamily="49" charset="0"/>
+              <a:cs typeface="Courier New"/>
+            </a:endParaRPr>
+          </a:p>
+          <a:p>
+            <a:r>
+              <a:rPr lang="en-US" dirty="0">
+                <a:latin typeface="Source Code Pro" panose="020B0509030403020204" pitchFamily="49" charset="0"/>
+                <a:cs typeface="Courier New"/>
+              </a:rPr>
+              <a:t>    </a:t>
+            </a:r>
+            <a:r>
+              <a:rPr lang="en-US" dirty="0" err="1">
+                <a:latin typeface="Source Code Pro" panose="020B0509030403020204" pitchFamily="49" charset="0"/>
+                <a:cs typeface="Courier New"/>
+              </a:rPr>
+              <a:t>def</a:t>
+            </a:r>
+            <a:r>
+              <a:rPr lang="en-US" dirty="0">
+                <a:latin typeface="Source Code Pro" panose="020B0509030403020204" pitchFamily="49" charset="0"/>
+                <a:cs typeface="Courier New"/>
+              </a:rPr>
+              <a:t> withdraw(self, amount):</a:t>
+            </a:r>
+          </a:p>
+          <a:p>
+            <a:r>
+              <a:rPr lang="en-US" dirty="0">
+                <a:latin typeface="Source Code Pro" panose="020B0509030403020204" pitchFamily="49" charset="0"/>
+                <a:cs typeface="Courier New"/>
+              </a:rPr>
+              <a:t>        </a:t>
+            </a:r>
+            <a:r>
+              <a:rPr lang="en-US" dirty="0" err="1">
+                <a:latin typeface="Source Code Pro" panose="020B0509030403020204" pitchFamily="49" charset="0"/>
+                <a:cs typeface="Courier New"/>
+              </a:rPr>
+              <a:t>self._balance</a:t>
+            </a:r>
+            <a:r>
+              <a:rPr lang="en-US" dirty="0">
+                <a:latin typeface="Source Code Pro" panose="020B0509030403020204" pitchFamily="49" charset="0"/>
+                <a:cs typeface="Courier New"/>
+              </a:rPr>
+              <a:t> -= amount</a:t>
+            </a:r>
+          </a:p>
+          <a:p>
+            <a:r>
+              <a:rPr lang="en-US" dirty="0">
+                <a:latin typeface="Source Code Pro" panose="020B0509030403020204" pitchFamily="49" charset="0"/>
+                <a:cs typeface="Courier New"/>
+              </a:rPr>
+              <a:t>        return </a:t>
+            </a:r>
+            <a:r>
+              <a:rPr lang="en-US" dirty="0" err="1">
+                <a:latin typeface="Source Code Pro" panose="020B0509030403020204" pitchFamily="49" charset="0"/>
+                <a:cs typeface="Courier New"/>
+              </a:rPr>
+              <a:t>self._balance</a:t>
+            </a:r>
+            <a:endParaRPr lang="en-US" dirty="0">
+              <a:latin typeface="Source Code Pro" panose="020B0509030403020204" pitchFamily="49" charset="0"/>
+              <a:cs typeface="Courier New"/>
+            </a:endParaRPr>
+          </a:p>
+        </p:txBody>
+      </p:sp>
+    </p:spTree>
+    <p:extLst>
+      <p:ext uri="{BB962C8B-B14F-4D97-AF65-F5344CB8AC3E}">
+        <p14:creationId xmlns:p14="http://schemas.microsoft.com/office/powerpoint/2010/main" val="3722888916"/>
+      </p:ext>
+    </p:extLst>
+  </p:cSld>
+  <p:clrMapOvr>
+    <a:masterClrMapping/>
+  </p:clrMapOvr>
+</p:sld>
+</file>
+
+<file path=ppt/slides/slide5.xml><?xml version="1.0" encoding="utf-8"?>
+<p:sld xmlns:a="http://schemas.openxmlformats.org/drawingml/2006/main" xmlns:r="http://schemas.openxmlformats.org/officeDocument/2006/relationships" xmlns:p="http://schemas.openxmlformats.org/presentationml/2006/main">
+  <p:cSld>
+    <p:spTree>
+      <p:nvGrpSpPr>
+        <p:cNvPr id="1" name=""/>
+        <p:cNvGrpSpPr/>
+        <p:nvPr/>
+      </p:nvGrpSpPr>
+      <p:grpSpPr>
+        <a:xfrm>
+          <a:off x="0" y="0"/>
+          <a:ext cx="0" cy="0"/>
+          <a:chOff x="0" y="0"/>
+          <a:chExt cx="0" cy="0"/>
+        </a:xfrm>
+      </p:grpSpPr>
+      <p:sp>
+        <p:nvSpPr>
+          <p:cNvPr id="2" name="Title 1"/>
+          <p:cNvSpPr>
+            <a:spLocks noGrp="1"/>
+          </p:cNvSpPr>
+          <p:nvPr>
+            <p:ph type="title"/>
+          </p:nvPr>
+        </p:nvSpPr>
+        <p:spPr/>
+        <p:txBody>
+          <a:bodyPr/>
+          <a:lstStyle/>
+          <a:p>
+            <a:r>
+              <a:rPr lang="en-US" dirty="0"/>
+              <a:t>More class attributes</a:t>
+            </a:r>
+          </a:p>
+        </p:txBody>
+      </p:sp>
+      <p:sp>
+        <p:nvSpPr>
+          <p:cNvPr id="7" name="Rectangle 6"/>
+          <p:cNvSpPr/>
+          <p:nvPr/>
+        </p:nvSpPr>
+        <p:spPr>
+          <a:xfrm>
+            <a:off x="2133600" y="1295400"/>
+            <a:ext cx="8077200" cy="5078314"/>
+          </a:xfrm>
+          <a:prstGeom prst="rect">
+            <a:avLst/>
+          </a:prstGeom>
+        </p:spPr>
+        <p:txBody>
+          <a:bodyPr wrap="square">
+            <a:spAutoFit/>
+          </a:bodyPr>
+          <a:lstStyle/>
+          <a:p>
+            <a:r>
+              <a:rPr lang="en-US" dirty="0">
+                <a:latin typeface="Source Code Pro" panose="020B0509030403020204" pitchFamily="49" charset="0"/>
+                <a:cs typeface="Courier New"/>
+              </a:rPr>
+              <a:t>class </a:t>
+            </a:r>
+            <a:r>
+              <a:rPr lang="en-US" dirty="0" err="1">
+                <a:latin typeface="Source Code Pro" panose="020B0509030403020204" pitchFamily="49" charset="0"/>
+                <a:cs typeface="Courier New"/>
+              </a:rPr>
+              <a:t>BaseAccount</a:t>
+            </a:r>
+            <a:r>
+              <a:rPr lang="en-US" dirty="0">
+                <a:latin typeface="Source Code Pro" panose="020B0509030403020204" pitchFamily="49" charset="0"/>
+                <a:cs typeface="Courier New"/>
+              </a:rPr>
+              <a:t>:</a:t>
+            </a:r>
+          </a:p>
+          <a:p>
+            <a:r>
+              <a:rPr lang="en-US" dirty="0">
+                <a:latin typeface="Source Code Pro" panose="020B0509030403020204" pitchFamily="49" charset="0"/>
+                <a:cs typeface="Courier New"/>
+              </a:rPr>
+              <a:t>    </a:t>
+            </a:r>
+            <a:r>
+              <a:rPr lang="en-US" dirty="0" err="1">
+                <a:latin typeface="Source Code Pro" panose="020B0509030403020204" pitchFamily="49" charset="0"/>
+                <a:cs typeface="Courier New"/>
+              </a:rPr>
+              <a:t>account_number_seed</a:t>
+            </a:r>
+            <a:r>
+              <a:rPr lang="en-US" dirty="0">
+                <a:latin typeface="Source Code Pro" panose="020B0509030403020204" pitchFamily="49" charset="0"/>
+                <a:cs typeface="Courier New"/>
+              </a:rPr>
+              <a:t> = 1000</a:t>
+            </a:r>
+          </a:p>
+          <a:p>
+            <a:r>
+              <a:rPr lang="en-US" dirty="0">
+                <a:latin typeface="Source Code Pro" panose="020B0509030403020204" pitchFamily="49" charset="0"/>
+                <a:cs typeface="Courier New"/>
+              </a:rPr>
+              <a:t>    accounts = []</a:t>
+            </a:r>
+          </a:p>
+          <a:p>
+            <a:r>
+              <a:rPr lang="en-US" dirty="0">
+                <a:latin typeface="Source Code Pro" panose="020B0509030403020204" pitchFamily="49" charset="0"/>
+                <a:cs typeface="Courier New"/>
+              </a:rPr>
+              <a:t>    </a:t>
+            </a:r>
+            <a:r>
+              <a:rPr lang="en-US" dirty="0" err="1">
+                <a:latin typeface="Source Code Pro" panose="020B0509030403020204" pitchFamily="49" charset="0"/>
+                <a:cs typeface="Courier New"/>
+              </a:rPr>
+              <a:t>def</a:t>
+            </a:r>
+            <a:r>
+              <a:rPr lang="en-US" dirty="0">
+                <a:latin typeface="Source Code Pro" panose="020B0509030403020204" pitchFamily="49" charset="0"/>
+                <a:cs typeface="Courier New"/>
+              </a:rPr>
+              <a:t> __</a:t>
+            </a:r>
+            <a:r>
+              <a:rPr lang="en-US" dirty="0" err="1">
+                <a:latin typeface="Source Code Pro" panose="020B0509030403020204" pitchFamily="49" charset="0"/>
+                <a:cs typeface="Courier New"/>
+              </a:rPr>
+              <a:t>init</a:t>
+            </a:r>
+            <a:r>
+              <a:rPr lang="en-US" dirty="0">
+                <a:latin typeface="Source Code Pro" panose="020B0509030403020204" pitchFamily="49" charset="0"/>
+                <a:cs typeface="Courier New"/>
+              </a:rPr>
+              <a:t>__(self, name, </a:t>
+            </a:r>
+            <a:r>
+              <a:rPr lang="en-US" dirty="0" err="1">
+                <a:latin typeface="Source Code Pro" panose="020B0509030403020204" pitchFamily="49" charset="0"/>
+                <a:cs typeface="Courier New"/>
+              </a:rPr>
+              <a:t>initial_deposit</a:t>
+            </a:r>
+            <a:r>
+              <a:rPr lang="en-US" dirty="0">
+                <a:latin typeface="Source Code Pro" panose="020B0509030403020204" pitchFamily="49" charset="0"/>
+                <a:cs typeface="Courier New"/>
+              </a:rPr>
+              <a:t>): </a:t>
+            </a:r>
+          </a:p>
+          <a:p>
+            <a:r>
+              <a:rPr lang="en-US" dirty="0">
+                <a:latin typeface="Source Code Pro" panose="020B0509030403020204" pitchFamily="49" charset="0"/>
+                <a:cs typeface="Courier New"/>
+              </a:rPr>
+              <a:t>        </a:t>
+            </a:r>
+            <a:r>
+              <a:rPr lang="en-US" dirty="0" err="1">
+                <a:latin typeface="Source Code Pro" panose="020B0509030403020204" pitchFamily="49" charset="0"/>
+                <a:cs typeface="Courier New"/>
+              </a:rPr>
+              <a:t>self._name</a:t>
+            </a:r>
+            <a:r>
+              <a:rPr lang="en-US" dirty="0">
+                <a:latin typeface="Source Code Pro" panose="020B0509030403020204" pitchFamily="49" charset="0"/>
+                <a:cs typeface="Courier New"/>
+              </a:rPr>
+              <a:t> = name </a:t>
+            </a:r>
+          </a:p>
+          <a:p>
+            <a:r>
+              <a:rPr lang="en-US" dirty="0">
+                <a:latin typeface="Source Code Pro" panose="020B0509030403020204" pitchFamily="49" charset="0"/>
+                <a:cs typeface="Courier New"/>
+              </a:rPr>
+              <a:t>        </a:t>
+            </a:r>
+            <a:r>
+              <a:rPr lang="en-US" dirty="0" err="1">
+                <a:latin typeface="Source Code Pro" panose="020B0509030403020204" pitchFamily="49" charset="0"/>
+                <a:cs typeface="Courier New"/>
+              </a:rPr>
+              <a:t>self._balance</a:t>
+            </a:r>
+            <a:r>
+              <a:rPr lang="en-US" dirty="0">
+                <a:latin typeface="Source Code Pro" panose="020B0509030403020204" pitchFamily="49" charset="0"/>
+                <a:cs typeface="Courier New"/>
+              </a:rPr>
+              <a:t> = </a:t>
+            </a:r>
+            <a:r>
+              <a:rPr lang="en-US" dirty="0" err="1">
+                <a:latin typeface="Source Code Pro" panose="020B0509030403020204" pitchFamily="49" charset="0"/>
+                <a:cs typeface="Courier New"/>
+              </a:rPr>
+              <a:t>initial_deposit</a:t>
+            </a:r>
+            <a:r>
+              <a:rPr lang="en-US" dirty="0">
+                <a:latin typeface="Source Code Pro" panose="020B0509030403020204" pitchFamily="49" charset="0"/>
+                <a:cs typeface="Courier New"/>
+              </a:rPr>
+              <a:t> </a:t>
+            </a:r>
+          </a:p>
+          <a:p>
+            <a:r>
+              <a:rPr lang="en-US" dirty="0">
+                <a:latin typeface="Source Code Pro" panose="020B0509030403020204" pitchFamily="49" charset="0"/>
+                <a:cs typeface="Courier New"/>
+              </a:rPr>
+              <a:t>        self._</a:t>
+            </a:r>
+            <a:r>
+              <a:rPr lang="en-US" dirty="0" err="1">
+                <a:latin typeface="Source Code Pro" panose="020B0509030403020204" pitchFamily="49" charset="0"/>
+                <a:cs typeface="Courier New"/>
+              </a:rPr>
+              <a:t>acct_no</a:t>
+            </a:r>
+            <a:r>
+              <a:rPr lang="en-US" dirty="0">
+                <a:latin typeface="Source Code Pro" panose="020B0509030403020204" pitchFamily="49" charset="0"/>
+                <a:cs typeface="Courier New"/>
+              </a:rPr>
+              <a:t> = </a:t>
+            </a:r>
+            <a:r>
+              <a:rPr lang="en-US" dirty="0" err="1">
+                <a:latin typeface="Source Code Pro" panose="020B0509030403020204" pitchFamily="49" charset="0"/>
+                <a:cs typeface="Courier New"/>
+              </a:rPr>
+              <a:t>BaseAccount.account_number_seed</a:t>
+            </a:r>
+            <a:r>
+              <a:rPr lang="en-US" dirty="0">
+                <a:latin typeface="Source Code Pro" panose="020B0509030403020204" pitchFamily="49" charset="0"/>
+                <a:cs typeface="Courier New"/>
+              </a:rPr>
+              <a:t>     </a:t>
+            </a:r>
+          </a:p>
+          <a:p>
+            <a:r>
+              <a:rPr lang="en-US" dirty="0">
+                <a:latin typeface="Source Code Pro" panose="020B0509030403020204" pitchFamily="49" charset="0"/>
+                <a:cs typeface="Courier New"/>
+              </a:rPr>
+              <a:t>        </a:t>
+            </a:r>
+            <a:r>
+              <a:rPr lang="en-US" dirty="0" err="1">
+                <a:latin typeface="Source Code Pro" panose="020B0509030403020204" pitchFamily="49" charset="0"/>
+                <a:cs typeface="Courier New"/>
+              </a:rPr>
+              <a:t>BaseAccount.account_number_seed</a:t>
+            </a:r>
+            <a:r>
+              <a:rPr lang="en-US" dirty="0">
+                <a:latin typeface="Source Code Pro" panose="020B0509030403020204" pitchFamily="49" charset="0"/>
+                <a:cs typeface="Courier New"/>
+              </a:rPr>
+              <a:t> += 1</a:t>
+            </a:r>
+          </a:p>
+          <a:p>
+            <a:r>
+              <a:rPr lang="en-US" dirty="0">
+                <a:latin typeface="Source Code Pro" panose="020B0509030403020204" pitchFamily="49" charset="0"/>
+                <a:cs typeface="Courier New"/>
+              </a:rPr>
+              <a:t>        </a:t>
+            </a:r>
+            <a:r>
+              <a:rPr lang="en-US" dirty="0" err="1">
+                <a:solidFill>
+                  <a:srgbClr val="0000FF"/>
+                </a:solidFill>
+                <a:latin typeface="Source Code Pro" panose="020B0509030403020204" pitchFamily="49" charset="0"/>
+                <a:cs typeface="Courier New"/>
+              </a:rPr>
+              <a:t>BaseAccount.accounts.append</a:t>
+            </a:r>
+            <a:r>
+              <a:rPr lang="en-US" dirty="0">
+                <a:solidFill>
+                  <a:srgbClr val="0000FF"/>
+                </a:solidFill>
+                <a:latin typeface="Source Code Pro" panose="020B0509030403020204" pitchFamily="49" charset="0"/>
+                <a:cs typeface="Courier New"/>
+              </a:rPr>
+              <a:t>(self)</a:t>
+            </a:r>
+          </a:p>
+          <a:p>
+            <a:endParaRPr lang="en-US" dirty="0">
+              <a:latin typeface="Source Code Pro" panose="020B0509030403020204" pitchFamily="49" charset="0"/>
+              <a:cs typeface="Courier New"/>
+            </a:endParaRPr>
+          </a:p>
+          <a:p>
+            <a:r>
+              <a:rPr lang="en-US" dirty="0">
+                <a:latin typeface="Source Code Pro" panose="020B0509030403020204" pitchFamily="49" charset="0"/>
+                <a:cs typeface="Courier New"/>
+              </a:rPr>
+              <a:t>    </a:t>
+            </a:r>
+            <a:r>
+              <a:rPr lang="en-US" dirty="0" err="1">
+                <a:latin typeface="Source Code Pro" panose="020B0509030403020204" pitchFamily="49" charset="0"/>
+                <a:cs typeface="Courier New"/>
+              </a:rPr>
+              <a:t>def</a:t>
+            </a:r>
+            <a:r>
+              <a:rPr lang="en-US" dirty="0">
+                <a:latin typeface="Source Code Pro" panose="020B0509030403020204" pitchFamily="49" charset="0"/>
+                <a:cs typeface="Courier New"/>
+              </a:rPr>
+              <a:t> name(self):</a:t>
+            </a:r>
+          </a:p>
+          <a:p>
+            <a:r>
+              <a:rPr lang="en-US" dirty="0">
+                <a:latin typeface="Source Code Pro" panose="020B0509030403020204" pitchFamily="49" charset="0"/>
+                <a:cs typeface="Courier New"/>
+              </a:rPr>
+              <a:t>        ...</a:t>
+            </a:r>
+          </a:p>
+          <a:p>
+            <a:endParaRPr lang="en-US" dirty="0">
+              <a:latin typeface="Source Code Pro" panose="020B0509030403020204" pitchFamily="49" charset="0"/>
+              <a:cs typeface="Courier New"/>
+            </a:endParaRPr>
+          </a:p>
+          <a:p>
+            <a:r>
+              <a:rPr lang="en-US" dirty="0">
+                <a:latin typeface="Source Code Pro" panose="020B0509030403020204" pitchFamily="49" charset="0"/>
+                <a:cs typeface="Courier New"/>
+              </a:rPr>
+              <a:t>    </a:t>
+            </a:r>
+            <a:r>
+              <a:rPr lang="en-US" dirty="0" err="1">
+                <a:solidFill>
+                  <a:srgbClr val="0000FF"/>
+                </a:solidFill>
+                <a:latin typeface="Source Code Pro" panose="020B0509030403020204" pitchFamily="49" charset="0"/>
+                <a:cs typeface="Courier New"/>
+              </a:rPr>
+              <a:t>def</a:t>
+            </a:r>
+            <a:r>
+              <a:rPr lang="en-US" dirty="0">
+                <a:solidFill>
+                  <a:srgbClr val="0000FF"/>
+                </a:solidFill>
+                <a:latin typeface="Source Code Pro" panose="020B0509030403020204" pitchFamily="49" charset="0"/>
+                <a:cs typeface="Courier New"/>
+              </a:rPr>
+              <a:t> </a:t>
+            </a:r>
+            <a:r>
+              <a:rPr lang="en-US" dirty="0" err="1">
+                <a:solidFill>
+                  <a:srgbClr val="0000FF"/>
+                </a:solidFill>
+                <a:latin typeface="Source Code Pro" panose="020B0509030403020204" pitchFamily="49" charset="0"/>
+                <a:cs typeface="Courier New"/>
+              </a:rPr>
+              <a:t>show_accounts</a:t>
+            </a:r>
+            <a:r>
+              <a:rPr lang="en-US" dirty="0">
+                <a:solidFill>
+                  <a:srgbClr val="0000FF"/>
+                </a:solidFill>
+                <a:latin typeface="Source Code Pro" panose="020B0509030403020204" pitchFamily="49" charset="0"/>
+                <a:cs typeface="Courier New"/>
+              </a:rPr>
+              <a:t>():</a:t>
+            </a:r>
+          </a:p>
+          <a:p>
+            <a:r>
+              <a:rPr lang="en-US" dirty="0">
+                <a:solidFill>
+                  <a:srgbClr val="0000FF"/>
+                </a:solidFill>
+                <a:latin typeface="Source Code Pro" panose="020B0509030403020204" pitchFamily="49" charset="0"/>
+                <a:cs typeface="Courier New"/>
+              </a:rPr>
+              <a:t>        for account in </a:t>
+            </a:r>
+            <a:r>
+              <a:rPr lang="en-US" dirty="0" err="1">
+                <a:solidFill>
+                  <a:srgbClr val="0000FF"/>
+                </a:solidFill>
+                <a:latin typeface="Source Code Pro" panose="020B0509030403020204" pitchFamily="49" charset="0"/>
+                <a:cs typeface="Courier New"/>
+              </a:rPr>
+              <a:t>BaseAccount.accounts</a:t>
+            </a:r>
+            <a:r>
+              <a:rPr lang="en-US" dirty="0">
+                <a:solidFill>
+                  <a:srgbClr val="0000FF"/>
+                </a:solidFill>
+                <a:latin typeface="Source Code Pro" panose="020B0509030403020204" pitchFamily="49" charset="0"/>
+                <a:cs typeface="Courier New"/>
+              </a:rPr>
+              <a:t>:</a:t>
+            </a:r>
+          </a:p>
+          <a:p>
+            <a:r>
+              <a:rPr lang="en-US" dirty="0">
+                <a:solidFill>
+                  <a:srgbClr val="0000FF"/>
+                </a:solidFill>
+                <a:latin typeface="Source Code Pro" panose="020B0509030403020204" pitchFamily="49" charset="0"/>
+                <a:cs typeface="Courier New"/>
+              </a:rPr>
+              <a:t>            print(</a:t>
+            </a:r>
+            <a:r>
+              <a:rPr lang="en-US" dirty="0" err="1">
+                <a:solidFill>
+                  <a:srgbClr val="0000FF"/>
+                </a:solidFill>
+                <a:latin typeface="Source Code Pro" panose="020B0509030403020204" pitchFamily="49" charset="0"/>
+                <a:cs typeface="Courier New"/>
+              </a:rPr>
+              <a:t>account.name</a:t>
+            </a:r>
+            <a:r>
+              <a:rPr lang="en-US" dirty="0">
+                <a:solidFill>
+                  <a:srgbClr val="0000FF"/>
+                </a:solidFill>
+                <a:latin typeface="Source Code Pro" panose="020B0509030403020204" pitchFamily="49" charset="0"/>
+                <a:cs typeface="Courier New"/>
+              </a:rPr>
+              <a:t>(),</a:t>
+            </a:r>
+          </a:p>
+          <a:p>
+            <a:r>
+              <a:rPr lang="en-US" dirty="0">
+                <a:solidFill>
+                  <a:srgbClr val="0000FF"/>
+                </a:solidFill>
+                <a:latin typeface="Source Code Pro" panose="020B0509030403020204" pitchFamily="49" charset="0"/>
+                <a:cs typeface="Courier New"/>
+              </a:rPr>
+              <a:t>                  </a:t>
+            </a:r>
+            <a:r>
+              <a:rPr lang="en-US" dirty="0" err="1">
+                <a:solidFill>
+                  <a:srgbClr val="0000FF"/>
+                </a:solidFill>
+                <a:latin typeface="Source Code Pro" panose="020B0509030403020204" pitchFamily="49" charset="0"/>
+                <a:cs typeface="Courier New"/>
+              </a:rPr>
+              <a:t>account.account_no</a:t>
+            </a:r>
+            <a:r>
+              <a:rPr lang="en-US" dirty="0">
+                <a:solidFill>
+                  <a:srgbClr val="0000FF"/>
+                </a:solidFill>
+                <a:latin typeface="Source Code Pro" panose="020B0509030403020204" pitchFamily="49" charset="0"/>
+                <a:cs typeface="Courier New"/>
+              </a:rPr>
+              <a:t>(),</a:t>
+            </a:r>
+            <a:r>
+              <a:rPr lang="en-US" dirty="0" err="1">
+                <a:solidFill>
+                  <a:srgbClr val="0000FF"/>
+                </a:solidFill>
+                <a:latin typeface="Source Code Pro" panose="020B0509030403020204" pitchFamily="49" charset="0"/>
+                <a:cs typeface="Courier New"/>
+              </a:rPr>
+              <a:t>account.balance</a:t>
+            </a:r>
+            <a:r>
+              <a:rPr lang="en-US" dirty="0">
+                <a:solidFill>
+                  <a:srgbClr val="0000FF"/>
+                </a:solidFill>
+                <a:latin typeface="Source Code Pro" panose="020B0509030403020204" pitchFamily="49" charset="0"/>
+                <a:cs typeface="Courier New"/>
+              </a:rPr>
+              <a:t>())</a:t>
+            </a:r>
+          </a:p>
+          <a:p>
+            <a:endParaRPr lang="en-US" dirty="0">
+              <a:latin typeface="Source Code Pro" panose="020B0509030403020204" pitchFamily="49" charset="0"/>
+              <a:cs typeface="Courier New"/>
+            </a:endParaRPr>
+          </a:p>
+        </p:txBody>
+      </p:sp>
+    </p:spTree>
+    <p:extLst>
+      <p:ext uri="{BB962C8B-B14F-4D97-AF65-F5344CB8AC3E}">
+        <p14:creationId xmlns:p14="http://schemas.microsoft.com/office/powerpoint/2010/main" val="214603123"/>
+      </p:ext>
+    </p:extLst>
+  </p:cSld>
+  <p:clrMapOvr>
+    <a:masterClrMapping/>
+  </p:clrMapOvr>
+</p:sld>
+</file>
+
+<file path=ppt/slides/slide6.xml><?xml version="1.0" encoding="utf-8"?>
 <p:sld xmlns:a="http://schemas.openxmlformats.org/drawingml/2006/main" xmlns:r="http://schemas.openxmlformats.org/officeDocument/2006/relationships" xmlns:p="http://schemas.openxmlformats.org/presentationml/2006/main">
   <p:cSld>
     <p:spTree>
@@ -6897,7 +8470,7 @@
 </p:sld>
 </file>
 
-<file path=ppt/slides/slide4.xml><?xml version="1.0" encoding="utf-8"?>
+<file path=ppt/slides/slide7.xml><?xml version="1.0" encoding="utf-8"?>
 <p:sld xmlns:a="http://schemas.openxmlformats.org/drawingml/2006/main" xmlns:r="http://schemas.openxmlformats.org/officeDocument/2006/relationships" xmlns:p="http://schemas.openxmlformats.org/presentationml/2006/main">
   <p:cSld>
     <p:spTree>
@@ -7055,7 +8628,7 @@
 </p:sld>
 </file>
 
-<file path=ppt/slides/slide5.xml><?xml version="1.0" encoding="utf-8"?>
+<file path=ppt/slides/slide8.xml><?xml version="1.0" encoding="utf-8"?>
 <p:sld xmlns:a="http://schemas.openxmlformats.org/drawingml/2006/main" xmlns:r="http://schemas.openxmlformats.org/officeDocument/2006/relationships" xmlns:p="http://schemas.openxmlformats.org/presentationml/2006/main">
   <p:cSld>
     <p:spTree>
@@ -7735,7 +9308,7 @@
 </p:sld>
 </file>
 
-<file path=ppt/slides/slide6.xml><?xml version="1.0" encoding="utf-8"?>
+<file path=ppt/slides/slide9.xml><?xml version="1.0" encoding="utf-8"?>
 <p:sld xmlns:a="http://schemas.openxmlformats.org/drawingml/2006/main" xmlns:r="http://schemas.openxmlformats.org/officeDocument/2006/relationships" xmlns:p="http://schemas.openxmlformats.org/presentationml/2006/main">
   <p:cSld>
     <p:spTree>
@@ -8367,398 +9940,6 @@
   <p:clrMapOvr>
     <a:masterClrMapping/>
   </p:clrMapOvr>
-</p:sld>
-</file>
-
-<file path=ppt/slides/slide7.xml><?xml version="1.0" encoding="utf-8"?>
-<p:sld xmlns:a="http://schemas.openxmlformats.org/drawingml/2006/main" xmlns:r="http://schemas.openxmlformats.org/officeDocument/2006/relationships" xmlns:p="http://schemas.openxmlformats.org/presentationml/2006/main">
-  <p:cSld>
-    <p:spTree>
-      <p:nvGrpSpPr>
-        <p:cNvPr id="1" name=""/>
-        <p:cNvGrpSpPr/>
-        <p:nvPr/>
-      </p:nvGrpSpPr>
-      <p:grpSpPr>
-        <a:xfrm>
-          <a:off x="0" y="0"/>
-          <a:ext cx="0" cy="0"/>
-          <a:chOff x="0" y="0"/>
-          <a:chExt cx="0" cy="0"/>
-        </a:xfrm>
-      </p:grpSpPr>
-      <p:sp>
-        <p:nvSpPr>
-          <p:cNvPr id="2" name="Title 1">
-            <a:extLst>
-              <a:ext uri="{FF2B5EF4-FFF2-40B4-BE49-F238E27FC236}">
-                <a16:creationId xmlns:a16="http://schemas.microsoft.com/office/drawing/2014/main" id="{5CC54221-AB87-1742-B0F3-04597FF2E297}"/>
-              </a:ext>
-            </a:extLst>
-          </p:cNvPr>
-          <p:cNvSpPr>
-            <a:spLocks noGrp="1"/>
-          </p:cNvSpPr>
-          <p:nvPr>
-            <p:ph type="title"/>
-          </p:nvPr>
-        </p:nvSpPr>
-        <p:spPr/>
-        <p:txBody>
-          <a:bodyPr/>
-          <a:lstStyle/>
-          <a:p>
-            <a:r>
-              <a:rPr lang="en-US" dirty="0"/>
-              <a:t>More Magic Methods</a:t>
-            </a:r>
-          </a:p>
-        </p:txBody>
-      </p:sp>
-      <p:sp>
-        <p:nvSpPr>
-          <p:cNvPr id="3" name="Content Placeholder 2">
-            <a:extLst>
-              <a:ext uri="{FF2B5EF4-FFF2-40B4-BE49-F238E27FC236}">
-                <a16:creationId xmlns:a16="http://schemas.microsoft.com/office/drawing/2014/main" id="{4A768C81-1ED4-5C45-B2D8-D738DB1323E7}"/>
-              </a:ext>
-            </a:extLst>
-          </p:cNvPr>
-          <p:cNvSpPr>
-            <a:spLocks noGrp="1"/>
-          </p:cNvSpPr>
-          <p:nvPr>
-            <p:ph idx="1"/>
-          </p:nvPr>
-        </p:nvSpPr>
-        <p:spPr/>
-        <p:txBody>
-          <a:bodyPr/>
-          <a:lstStyle/>
-          <a:p>
-            <a:r>
-              <a:rPr lang="en-US" sz="2800" dirty="0"/>
-              <a:t>We will </a:t>
-            </a:r>
-            <a:r>
-              <a:rPr lang="en-US" sz="2800" b="1" dirty="0"/>
-              <a:t>not</a:t>
-            </a:r>
-            <a:r>
-              <a:rPr lang="en-US" sz="2800" dirty="0"/>
-              <a:t> go through an exhaustive list!</a:t>
-            </a:r>
-          </a:p>
-          <a:p>
-            <a:r>
-              <a:rPr lang="en-US" sz="2800" dirty="0"/>
-              <a:t> Magic Methods start and end with "double underscores" </a:t>
-            </a:r>
-            <a:r>
-              <a:rPr lang="en-US" sz="2800" dirty="0">
-                <a:latin typeface="Source Code Pro" panose="020B0509030403020204" pitchFamily="49" charset="0"/>
-                <a:ea typeface="Source Code Pro" panose="020B0509030403020204" pitchFamily="49" charset="0"/>
-              </a:rPr>
-              <a:t>__</a:t>
-            </a:r>
-          </a:p>
-          <a:p>
-            <a:r>
-              <a:rPr lang="en-US" sz="2800" dirty="0"/>
-              <a:t>They map to built-in functionality in Python. Many are logical names:</a:t>
-            </a:r>
-          </a:p>
-          <a:p>
-            <a:pPr lvl="1"/>
-            <a:r>
-              <a:rPr lang="en-US" sz="2800" dirty="0"/>
-              <a:t> </a:t>
-            </a:r>
-            <a:r>
-              <a:rPr lang="en-US" sz="2800" dirty="0">
-                <a:latin typeface="Source Code Pro" panose="020B0509030403020204" pitchFamily="49" charset="0"/>
-                <a:ea typeface="Source Code Pro" panose="020B0509030403020204" pitchFamily="49" charset="0"/>
-              </a:rPr>
-              <a:t>__add__</a:t>
-            </a:r>
-            <a:r>
-              <a:rPr lang="en-US" sz="2800" dirty="0"/>
-              <a:t> =&gt;  </a:t>
-            </a:r>
-            <a:r>
-              <a:rPr lang="en-US" sz="2800" dirty="0">
-                <a:latin typeface="Source Code Pro" panose="020B0509030403020204" pitchFamily="49" charset="0"/>
-                <a:ea typeface="Source Code Pro" panose="020B0509030403020204" pitchFamily="49" charset="0"/>
-              </a:rPr>
-              <a:t>+</a:t>
-            </a:r>
-            <a:r>
-              <a:rPr lang="en-US" sz="2800" dirty="0"/>
-              <a:t> operator</a:t>
-            </a:r>
-          </a:p>
-          <a:p>
-            <a:pPr lvl="1"/>
-            <a:r>
-              <a:rPr lang="en-US" sz="2800" dirty="0"/>
-              <a:t> </a:t>
-            </a:r>
-            <a:r>
-              <a:rPr lang="en-US" sz="2800" dirty="0">
-                <a:latin typeface="Source Code Pro" panose="020B0509030403020204" pitchFamily="49" charset="0"/>
-                <a:ea typeface="Source Code Pro" panose="020B0509030403020204" pitchFamily="49" charset="0"/>
-              </a:rPr>
-              <a:t>__sub__ </a:t>
-            </a:r>
-            <a:r>
-              <a:rPr lang="en-US" sz="2800" dirty="0"/>
-              <a:t>=&gt; </a:t>
-            </a:r>
-            <a:r>
-              <a:rPr lang="en-US" sz="2800" dirty="0">
-                <a:latin typeface="Source Code Pro" panose="020B0509030403020204" pitchFamily="49" charset="0"/>
-                <a:ea typeface="Source Code Pro" panose="020B0509030403020204" pitchFamily="49" charset="0"/>
-              </a:rPr>
-              <a:t>-</a:t>
-            </a:r>
-            <a:r>
-              <a:rPr lang="en-US" sz="2800" dirty="0"/>
-              <a:t> operator</a:t>
-            </a:r>
-          </a:p>
-          <a:p>
-            <a:pPr lvl="1"/>
-            <a:r>
-              <a:rPr lang="en-US" sz="2800" dirty="0"/>
-              <a:t> </a:t>
-            </a:r>
-            <a:r>
-              <a:rPr lang="en-US" sz="2800" dirty="0">
-                <a:latin typeface="Source Code Pro" panose="020B0509030403020204" pitchFamily="49" charset="0"/>
-                <a:ea typeface="Source Code Pro" panose="020B0509030403020204" pitchFamily="49" charset="0"/>
-              </a:rPr>
-              <a:t>__</a:t>
-            </a:r>
-            <a:r>
-              <a:rPr lang="en-US" sz="2800" dirty="0" err="1">
-                <a:latin typeface="Source Code Pro" panose="020B0509030403020204" pitchFamily="49" charset="0"/>
-                <a:ea typeface="Source Code Pro" panose="020B0509030403020204" pitchFamily="49" charset="0"/>
-              </a:rPr>
-              <a:t>getitem</a:t>
-            </a:r>
-            <a:r>
-              <a:rPr lang="en-US" sz="2800" dirty="0">
-                <a:latin typeface="Source Code Pro" panose="020B0509030403020204" pitchFamily="49" charset="0"/>
-                <a:ea typeface="Source Code Pro" panose="020B0509030403020204" pitchFamily="49" charset="0"/>
-              </a:rPr>
-              <a:t>__</a:t>
-            </a:r>
-            <a:r>
-              <a:rPr lang="en-US" sz="2800" dirty="0"/>
-              <a:t> =&gt; </a:t>
-            </a:r>
-            <a:r>
-              <a:rPr lang="en-US" sz="2800" dirty="0">
-                <a:latin typeface="Source Code Pro" panose="020B0509030403020204" pitchFamily="49" charset="0"/>
-                <a:ea typeface="Source Code Pro" panose="020B0509030403020204" pitchFamily="49" charset="0"/>
-              </a:rPr>
-              <a:t>[]</a:t>
-            </a:r>
-            <a:r>
-              <a:rPr lang="en-US" sz="2800" dirty="0"/>
-              <a:t> operator</a:t>
-            </a:r>
-          </a:p>
-          <a:p>
-            <a:r>
-              <a:rPr lang="en-US" sz="2800" dirty="0"/>
-              <a:t> A longer list for the curious:</a:t>
-            </a:r>
-          </a:p>
-          <a:p>
-            <a:pPr lvl="1"/>
-            <a:r>
-              <a:rPr lang="en-US" sz="2800" dirty="0"/>
-              <a:t> </a:t>
-            </a:r>
-            <a:r>
-              <a:rPr lang="en-US" sz="2800" dirty="0">
-                <a:hlinkClick r:id="rId2"/>
-              </a:rPr>
-              <a:t>https://docs.python.org/3/reference/datamodel.html</a:t>
-            </a:r>
-            <a:r>
-              <a:rPr lang="en-US" sz="2800" dirty="0"/>
-              <a:t> </a:t>
-            </a:r>
-          </a:p>
-        </p:txBody>
-      </p:sp>
-    </p:spTree>
-    <p:extLst>
-      <p:ext uri="{BB962C8B-B14F-4D97-AF65-F5344CB8AC3E}">
-        <p14:creationId xmlns:p14="http://schemas.microsoft.com/office/powerpoint/2010/main" val="288930881"/>
-      </p:ext>
-    </p:extLst>
-  </p:cSld>
-  <p:clrMapOvr>
-    <a:masterClrMapping/>
-  </p:clrMapOvr>
-</p:sld>
-</file>
-
-<file path=ppt/slides/slide8.xml><?xml version="1.0" encoding="utf-8"?>
-<p:sld xmlns:a="http://schemas.openxmlformats.org/drawingml/2006/main" xmlns:r="http://schemas.openxmlformats.org/officeDocument/2006/relationships" xmlns:p="http://schemas.openxmlformats.org/presentationml/2006/main">
-  <p:cSld>
-    <p:spTree>
-      <p:nvGrpSpPr>
-        <p:cNvPr id="1" name=""/>
-        <p:cNvGrpSpPr/>
-        <p:nvPr/>
-      </p:nvGrpSpPr>
-      <p:grpSpPr>
-        <a:xfrm>
-          <a:off x="0" y="0"/>
-          <a:ext cx="0" cy="0"/>
-          <a:chOff x="0" y="0"/>
-          <a:chExt cx="0" cy="0"/>
-        </a:xfrm>
-      </p:grpSpPr>
-      <p:sp>
-        <p:nvSpPr>
-          <p:cNvPr id="2" name="Title 1">
-            <a:extLst>
-              <a:ext uri="{FF2B5EF4-FFF2-40B4-BE49-F238E27FC236}">
-                <a16:creationId xmlns:a16="http://schemas.microsoft.com/office/drawing/2014/main" id="{4FA45057-AAA5-5A48-9B81-EB6F66132F39}"/>
-              </a:ext>
-            </a:extLst>
-          </p:cNvPr>
-          <p:cNvSpPr>
-            <a:spLocks noGrp="1"/>
-          </p:cNvSpPr>
-          <p:nvPr>
-            <p:ph type="title"/>
-          </p:nvPr>
-        </p:nvSpPr>
-        <p:spPr/>
-        <p:txBody>
-          <a:bodyPr/>
-          <a:lstStyle/>
-          <a:p>
-            <a:r>
-              <a:rPr lang="en-US" dirty="0"/>
-              <a:t>Live Demo</a:t>
-            </a:r>
-          </a:p>
-        </p:txBody>
-      </p:sp>
-      <p:sp>
-        <p:nvSpPr>
-          <p:cNvPr id="3" name="Content Placeholder 2">
-            <a:extLst>
-              <a:ext uri="{FF2B5EF4-FFF2-40B4-BE49-F238E27FC236}">
-                <a16:creationId xmlns:a16="http://schemas.microsoft.com/office/drawing/2014/main" id="{7DDD5D33-F578-0540-94A6-AE539CC271DD}"/>
-              </a:ext>
-            </a:extLst>
-          </p:cNvPr>
-          <p:cNvSpPr>
-            <a:spLocks noGrp="1"/>
-          </p:cNvSpPr>
-          <p:nvPr>
-            <p:ph idx="1"/>
-          </p:nvPr>
-        </p:nvSpPr>
-        <p:spPr/>
-        <p:txBody>
-          <a:bodyPr/>
-          <a:lstStyle/>
-          <a:p>
-            <a:endParaRPr lang="en-US"/>
-          </a:p>
-        </p:txBody>
-      </p:sp>
-    </p:spTree>
-    <p:extLst>
-      <p:ext uri="{BB962C8B-B14F-4D97-AF65-F5344CB8AC3E}">
-        <p14:creationId xmlns:p14="http://schemas.microsoft.com/office/powerpoint/2010/main" val="3124443451"/>
-      </p:ext>
-    </p:extLst>
-  </p:cSld>
-  <p:clrMapOvr>
-    <a:masterClrMapping/>
-  </p:clrMapOvr>
-</p:sld>
-</file>
-
-<file path=ppt/slides/slide9.xml><?xml version="1.0" encoding="utf-8"?>
-<p:sld xmlns:a="http://schemas.openxmlformats.org/drawingml/2006/main" xmlns:r="http://schemas.openxmlformats.org/officeDocument/2006/relationships" xmlns:p="http://schemas.openxmlformats.org/presentationml/2006/main">
-  <p:cSld>
-    <p:spTree>
-      <p:nvGrpSpPr>
-        <p:cNvPr id="1" name=""/>
-        <p:cNvGrpSpPr/>
-        <p:nvPr/>
-      </p:nvGrpSpPr>
-      <p:grpSpPr>
-        <a:xfrm>
-          <a:off x="0" y="0"/>
-          <a:ext cx="0" cy="0"/>
-          <a:chOff x="0" y="0"/>
-          <a:chExt cx="0" cy="0"/>
-        </a:xfrm>
-      </p:grpSpPr>
-      <p:sp>
-        <p:nvSpPr>
-          <p:cNvPr id="17411" name="Rectangle 2"/>
-          <p:cNvSpPr>
-            <a:spLocks noGrp="1" noChangeArrowheads="1"/>
-          </p:cNvSpPr>
-          <p:nvPr>
-            <p:ph type="ctrTitle"/>
-          </p:nvPr>
-        </p:nvSpPr>
-        <p:spPr>
-          <a:xfrm>
-            <a:off x="2819400" y="2130432"/>
-            <a:ext cx="8458200" cy="1470025"/>
-          </a:xfrm>
-        </p:spPr>
-        <p:txBody>
-          <a:bodyPr/>
-          <a:lstStyle/>
-          <a:p>
-            <a:r>
-              <a:rPr lang="en-US" dirty="0"/>
-              <a:t>Object-Oriented Programming:</a:t>
-            </a:r>
-            <a:br>
-              <a:rPr lang="en-US" dirty="0"/>
-            </a:br>
-            <a:r>
-              <a:rPr lang="en-US" dirty="0"/>
-              <a:t>Inheritance</a:t>
-            </a:r>
-          </a:p>
-        </p:txBody>
-      </p:sp>
-    </p:spTree>
-    <p:extLst>
-      <p:ext uri="{BB962C8B-B14F-4D97-AF65-F5344CB8AC3E}">
-        <p14:creationId xmlns:p14="http://schemas.microsoft.com/office/powerpoint/2010/main" val="2854198525"/>
-      </p:ext>
-    </p:extLst>
-  </p:cSld>
-  <p:clrMapOvr>
-    <a:masterClrMapping/>
-  </p:clrMapOvr>
-  <mc:AlternateContent xmlns:mc="http://schemas.openxmlformats.org/markup-compatibility/2006" xmlns:p14="http://schemas.microsoft.com/office/powerpoint/2010/main">
-    <mc:Choice Requires="p14">
-      <p:transition spd="slow" p14:dur="2000" advTm="109658"/>
-    </mc:Choice>
-    <mc:Fallback xmlns="">
-      <p:transition xmlns:p14="http://schemas.microsoft.com/office/powerpoint/2010/main" spd="slow" advTm="109658"/>
-    </mc:Fallback>
-  </mc:AlternateContent>
 </p:sld>
 </file>
 

</xml_diff>

<commit_message>
Deploy website Thu Oct 13 13:02:22 PDT 2022
</commit_message>
<xml_diff>
--- a/assets/slides/fa22/14-OOP_II.pptx
+++ b/assets/slides/fa22/14-OOP_II.pptx
@@ -7346,6 +7346,48 @@
               <a:rPr lang="en-US" dirty="0"/>
               <a:t> It's easy to overdo class attributes</a:t>
             </a:r>
+          </a:p>
+          <a:p>
+            <a:pPr lvl="1"/>
+            <a:endParaRPr lang="en-US" dirty="0"/>
+          </a:p>
+          <a:p>
+            <a:r>
+              <a:rPr lang="en-US" dirty="0"/>
+              <a:t> Methods that rely only on class attributes are called </a:t>
+            </a:r>
+            <a:r>
+              <a:rPr lang="en-US" i="1" dirty="0"/>
+              <a:t>class methods</a:t>
+            </a:r>
+            <a:endParaRPr lang="en-US" dirty="0"/>
+          </a:p>
+          <a:p>
+            <a:pPr lvl="1"/>
+            <a:r>
+              <a:rPr lang="en-US" dirty="0"/>
+              <a:t> Python has some special features we won't use, but are useful:</a:t>
+            </a:r>
+          </a:p>
+          <a:p>
+            <a:pPr lvl="2"/>
+            <a:r>
+              <a:rPr lang="en-US" dirty="0"/>
+              <a:t> </a:t>
+            </a:r>
+            <a:r>
+              <a:rPr lang="en-US" dirty="0">
+                <a:hlinkClick r:id="rId2"/>
+              </a:rPr>
+              <a:t>https://docs.python.org/3/library/functions.html?highlight=classmethod#classmethod</a:t>
+            </a:r>
+            <a:endParaRPr lang="en-US" dirty="0"/>
+          </a:p>
+          <a:p>
+            <a:pPr marL="385763" lvl="2" indent="0">
+              <a:buNone/>
+            </a:pPr>
+            <a:endParaRPr lang="en-US" dirty="0"/>
           </a:p>
         </p:txBody>
       </p:sp>

</xml_diff>